<commit_message>
update entity framework content
</commit_message>
<xml_diff>
--- a/entity framework/Entity Framework.pptx
+++ b/entity framework/Entity Framework.pptx
@@ -18,7 +18,20 @@
     <p:sldId id="266" r:id="rId12"/>
     <p:sldId id="267" r:id="rId13"/>
     <p:sldId id="268" r:id="rId14"/>
-    <p:sldId id="269" r:id="rId15"/>
+    <p:sldId id="270" r:id="rId15"/>
+    <p:sldId id="271" r:id="rId16"/>
+    <p:sldId id="269" r:id="rId17"/>
+    <p:sldId id="274" r:id="rId18"/>
+    <p:sldId id="273" r:id="rId19"/>
+    <p:sldId id="272" r:id="rId20"/>
+    <p:sldId id="279" r:id="rId21"/>
+    <p:sldId id="280" r:id="rId22"/>
+    <p:sldId id="281" r:id="rId23"/>
+    <p:sldId id="275" r:id="rId24"/>
+    <p:sldId id="276" r:id="rId25"/>
+    <p:sldId id="277" r:id="rId26"/>
+    <p:sldId id="278" r:id="rId27"/>
+    <p:sldId id="282" r:id="rId28"/>
   </p:sldIdLst>
   <p:sldSz cx="12192000" cy="6858000"/>
   <p:notesSz cx="6858000" cy="9144000"/>
@@ -120,7 +133,7 @@
   <p:extLst>
     <p:ext uri="{521415D9-36F7-43E2-AB2F-B90AF26B5E84}">
       <p14:sectionLst xmlns:p14="http://schemas.microsoft.com/office/powerpoint/2010/main">
-        <p14:section name="Default Section" id="{FCA36288-E965-4D07-AA22-652522845B17}">
+        <p14:section name="Entity Framework" id="{FCA36288-E965-4D07-AA22-652522845B17}">
           <p14:sldIdLst>
             <p14:sldId id="256"/>
             <p14:sldId id="257"/>
@@ -139,14 +152,38 @@
             <p14:sldId id="266"/>
             <p14:sldId id="267"/>
             <p14:sldId id="268"/>
+            <p14:sldId id="270"/>
+            <p14:sldId id="271"/>
+            <p14:sldId id="269"/>
+            <p14:sldId id="274"/>
+            <p14:sldId id="273"/>
           </p14:sldIdLst>
         </p14:section>
-        <p14:section name="Implement" id="{E2E9064C-021C-4DBC-9874-59AEF073C075}">
+        <p14:section name="Ef6" id="{7FD257D5-0B32-4831-880A-3F9ECC28200A}">
           <p14:sldIdLst>
-            <p14:sldId id="269"/>
+            <p14:sldId id="272"/>
+            <p14:sldId id="279"/>
+            <p14:sldId id="280"/>
+            <p14:sldId id="281"/>
+          </p14:sldIdLst>
+        </p14:section>
+        <p14:section name="EF Core" id="{CA285C2E-6AB4-49A8-B076-2A59E42269B9}">
+          <p14:sldIdLst>
+            <p14:sldId id="275"/>
+            <p14:sldId id="276"/>
+            <p14:sldId id="277"/>
+            <p14:sldId id="278"/>
+          </p14:sldIdLst>
+        </p14:section>
+        <p14:section name="Assignment" id="{454073A0-5C1E-42F2-9EC3-A49A769C641A}">
+          <p14:sldIdLst>
+            <p14:sldId id="282"/>
           </p14:sldIdLst>
         </p14:section>
       </p14:sectionLst>
+    </p:ext>
+    <p:ext uri="{EFAFB233-063F-42B5-8137-9DF3F51BA10A}">
+      <p15:sldGuideLst xmlns:p15="http://schemas.microsoft.com/office/powerpoint/2012/main"/>
     </p:ext>
   </p:extLst>
 </p:presentation>
@@ -398,7 +435,7 @@
             <a:fld id="{B61BEF0D-F0BB-DE4B-95CE-6DB70DBA9567}" type="datetimeFigureOut">
               <a:rPr lang="en-US" dirty="0"/>
               <a:pPr/>
-              <a:t>10/2/2018</a:t>
+              <a:t>10/8/2018</a:t>
             </a:fld>
             <a:endParaRPr lang="en-US" dirty="0"/>
           </a:p>
@@ -657,7 +694,7 @@
             <a:fld id="{B61BEF0D-F0BB-DE4B-95CE-6DB70DBA9567}" type="datetimeFigureOut">
               <a:rPr lang="en-US" dirty="0"/>
               <a:pPr/>
-              <a:t>10/2/2018</a:t>
+              <a:t>10/8/2018</a:t>
             </a:fld>
             <a:endParaRPr lang="en-US" dirty="0"/>
           </a:p>
@@ -889,7 +926,7 @@
             <a:fld id="{B61BEF0D-F0BB-DE4B-95CE-6DB70DBA9567}" type="datetimeFigureOut">
               <a:rPr lang="en-US" dirty="0"/>
               <a:pPr/>
-              <a:t>10/2/2018</a:t>
+              <a:t>10/8/2018</a:t>
             </a:fld>
             <a:endParaRPr lang="en-US" dirty="0"/>
           </a:p>
@@ -1126,7 +1163,7 @@
             <a:fld id="{B61BEF0D-F0BB-DE4B-95CE-6DB70DBA9567}" type="datetimeFigureOut">
               <a:rPr lang="en-US" dirty="0"/>
               <a:pPr/>
-              <a:t>10/2/2018</a:t>
+              <a:t>10/8/2018</a:t>
             </a:fld>
             <a:endParaRPr lang="en-US" dirty="0"/>
           </a:p>
@@ -1430,7 +1467,7 @@
             <a:fld id="{B61BEF0D-F0BB-DE4B-95CE-6DB70DBA9567}" type="datetimeFigureOut">
               <a:rPr lang="en-US" dirty="0"/>
               <a:pPr/>
-              <a:t>10/2/2018</a:t>
+              <a:t>10/8/2018</a:t>
             </a:fld>
             <a:endParaRPr lang="en-US" dirty="0"/>
           </a:p>
@@ -1729,7 +1766,7 @@
             <a:fld id="{B61BEF0D-F0BB-DE4B-95CE-6DB70DBA9567}" type="datetimeFigureOut">
               <a:rPr lang="en-US" dirty="0"/>
               <a:pPr/>
-              <a:t>10/2/2018</a:t>
+              <a:t>10/8/2018</a:t>
             </a:fld>
             <a:endParaRPr lang="en-US" dirty="0"/>
           </a:p>
@@ -2148,7 +2185,7 @@
             <a:fld id="{B61BEF0D-F0BB-DE4B-95CE-6DB70DBA9567}" type="datetimeFigureOut">
               <a:rPr lang="en-US" dirty="0"/>
               <a:pPr/>
-              <a:t>10/2/2018</a:t>
+              <a:t>10/8/2018</a:t>
             </a:fld>
             <a:endParaRPr lang="en-US" dirty="0"/>
           </a:p>
@@ -2307,7 +2344,7 @@
             <a:fld id="{B61BEF0D-F0BB-DE4B-95CE-6DB70DBA9567}" type="datetimeFigureOut">
               <a:rPr lang="en-US" dirty="0"/>
               <a:pPr/>
-              <a:t>10/2/2018</a:t>
+              <a:t>10/8/2018</a:t>
             </a:fld>
             <a:endParaRPr lang="en-US" dirty="0"/>
           </a:p>
@@ -2399,7 +2436,7 @@
             <a:fld id="{B61BEF0D-F0BB-DE4B-95CE-6DB70DBA9567}" type="datetimeFigureOut">
               <a:rPr lang="en-US" dirty="0"/>
               <a:pPr/>
-              <a:t>10/2/2018</a:t>
+              <a:t>10/8/2018</a:t>
             </a:fld>
             <a:endParaRPr lang="en-US" dirty="0"/>
           </a:p>
@@ -2774,7 +2811,7 @@
             <a:fld id="{B61BEF0D-F0BB-DE4B-95CE-6DB70DBA9567}" type="datetimeFigureOut">
               <a:rPr lang="en-US" dirty="0"/>
               <a:pPr/>
-              <a:t>10/2/2018</a:t>
+              <a:t>10/8/2018</a:t>
             </a:fld>
             <a:endParaRPr lang="en-US" dirty="0"/>
           </a:p>
@@ -3060,7 +3097,7 @@
             <a:fld id="{B61BEF0D-F0BB-DE4B-95CE-6DB70DBA9567}" type="datetimeFigureOut">
               <a:rPr lang="en-US" dirty="0"/>
               <a:pPr/>
-              <a:t>10/2/2018</a:t>
+              <a:t>10/8/2018</a:t>
             </a:fld>
             <a:endParaRPr lang="en-US" dirty="0"/>
           </a:p>
@@ -3268,7 +3305,7 @@
             <a:fld id="{B61BEF0D-F0BB-DE4B-95CE-6DB70DBA9567}" type="datetimeFigureOut">
               <a:rPr lang="en-US" dirty="0"/>
               <a:pPr/>
-              <a:t>10/2/2018</a:t>
+              <a:t>10/8/2018</a:t>
             </a:fld>
             <a:endParaRPr lang="en-US" dirty="0"/>
           </a:p>
@@ -4353,6 +4390,224 @@
           <p:cNvPr id="2" name="Title 1">
             <a:extLst>
               <a:ext uri="{FF2B5EF4-FFF2-40B4-BE49-F238E27FC236}">
+                <a16:creationId xmlns:a16="http://schemas.microsoft.com/office/drawing/2014/main" id="{DB34BC9C-9428-4B35-BA09-5337BBD3E609}"/>
+              </a:ext>
+            </a:extLst>
+          </p:cNvPr>
+          <p:cNvSpPr>
+            <a:spLocks noGrp="1"/>
+          </p:cNvSpPr>
+          <p:nvPr>
+            <p:ph type="title"/>
+          </p:nvPr>
+        </p:nvSpPr>
+        <p:spPr/>
+        <p:txBody>
+          <a:bodyPr/>
+          <a:lstStyle/>
+          <a:p>
+            <a:r>
+              <a:rPr lang="en-US" dirty="0"/>
+              <a:t>Entity Framework Core</a:t>
+            </a:r>
+          </a:p>
+        </p:txBody>
+      </p:sp>
+      <p:sp>
+        <p:nvSpPr>
+          <p:cNvPr id="3" name="Content Placeholder 2">
+            <a:extLst>
+              <a:ext uri="{FF2B5EF4-FFF2-40B4-BE49-F238E27FC236}">
+                <a16:creationId xmlns:a16="http://schemas.microsoft.com/office/drawing/2014/main" id="{CEA7E887-76FD-4139-AB6A-9913A694D9DF}"/>
+              </a:ext>
+            </a:extLst>
+          </p:cNvPr>
+          <p:cNvSpPr>
+            <a:spLocks noGrp="1"/>
+          </p:cNvSpPr>
+          <p:nvPr>
+            <p:ph idx="1"/>
+          </p:nvPr>
+        </p:nvSpPr>
+        <p:spPr>
+          <a:xfrm>
+            <a:off x="581192" y="2180497"/>
+            <a:ext cx="11029615" cy="1013800"/>
+          </a:xfrm>
+        </p:spPr>
+        <p:txBody>
+          <a:bodyPr/>
+          <a:lstStyle/>
+          <a:p>
+            <a:pPr marL="324000" lvl="1" indent="0">
+              <a:buNone/>
+            </a:pPr>
+            <a:r>
+              <a:rPr lang="en-US" dirty="0"/>
+              <a:t>	Entity Framework Core is the new version of Entity Framework after EF 6.x. It is open-source, lightweight, extensible and a cross-platform version of Entity Framework data access technology.</a:t>
+            </a:r>
+          </a:p>
+          <a:p>
+            <a:endParaRPr lang="en-US" dirty="0"/>
+          </a:p>
+        </p:txBody>
+      </p:sp>
+      <p:pic>
+        <p:nvPicPr>
+          <p:cNvPr id="5" name="Picture 4">
+            <a:extLst>
+              <a:ext uri="{FF2B5EF4-FFF2-40B4-BE49-F238E27FC236}">
+                <a16:creationId xmlns:a16="http://schemas.microsoft.com/office/drawing/2014/main" id="{4D8A9387-BCEB-433C-93F2-39F86F4ACCDA}"/>
+              </a:ext>
+            </a:extLst>
+          </p:cNvPr>
+          <p:cNvPicPr>
+            <a:picLocks noChangeAspect="1"/>
+          </p:cNvPicPr>
+          <p:nvPr/>
+        </p:nvPicPr>
+        <p:blipFill>
+          <a:blip r:embed="rId2"/>
+          <a:stretch>
+            <a:fillRect/>
+          </a:stretch>
+        </p:blipFill>
+        <p:spPr>
+          <a:xfrm>
+            <a:off x="1604108" y="2867725"/>
+            <a:ext cx="8983784" cy="3878308"/>
+          </a:xfrm>
+          <a:prstGeom prst="rect">
+            <a:avLst/>
+          </a:prstGeom>
+        </p:spPr>
+      </p:pic>
+    </p:spTree>
+    <p:extLst>
+      <p:ext uri="{BB962C8B-B14F-4D97-AF65-F5344CB8AC3E}">
+        <p14:creationId xmlns:p14="http://schemas.microsoft.com/office/powerpoint/2010/main" val="3844545941"/>
+      </p:ext>
+    </p:extLst>
+  </p:cSld>
+  <p:clrMapOvr>
+    <a:masterClrMapping/>
+  </p:clrMapOvr>
+</p:sld>
+</file>
+
+<file path=ppt/slides/slide15.xml><?xml version="1.0" encoding="utf-8"?>
+<p:sld xmlns:a="http://schemas.openxmlformats.org/drawingml/2006/main" xmlns:r="http://schemas.openxmlformats.org/officeDocument/2006/relationships" xmlns:p="http://schemas.openxmlformats.org/presentationml/2006/main">
+  <p:cSld>
+    <p:spTree>
+      <p:nvGrpSpPr>
+        <p:cNvPr id="1" name=""/>
+        <p:cNvGrpSpPr/>
+        <p:nvPr/>
+      </p:nvGrpSpPr>
+      <p:grpSpPr>
+        <a:xfrm>
+          <a:off x="0" y="0"/>
+          <a:ext cx="0" cy="0"/>
+          <a:chOff x="0" y="0"/>
+          <a:chExt cx="0" cy="0"/>
+        </a:xfrm>
+      </p:grpSpPr>
+      <p:sp>
+        <p:nvSpPr>
+          <p:cNvPr id="2" name="Title 1">
+            <a:extLst>
+              <a:ext uri="{FF2B5EF4-FFF2-40B4-BE49-F238E27FC236}">
+                <a16:creationId xmlns:a16="http://schemas.microsoft.com/office/drawing/2014/main" id="{40D14189-4467-4266-996A-F7002FA196EC}"/>
+              </a:ext>
+            </a:extLst>
+          </p:cNvPr>
+          <p:cNvSpPr>
+            <a:spLocks noGrp="1"/>
+          </p:cNvSpPr>
+          <p:nvPr>
+            <p:ph type="title"/>
+          </p:nvPr>
+        </p:nvSpPr>
+        <p:spPr/>
+        <p:txBody>
+          <a:bodyPr/>
+          <a:lstStyle/>
+          <a:p>
+            <a:r>
+              <a:rPr lang="en-US" dirty="0"/>
+              <a:t>Entity Framework Core</a:t>
+            </a:r>
+          </a:p>
+        </p:txBody>
+      </p:sp>
+      <p:sp>
+        <p:nvSpPr>
+          <p:cNvPr id="3" name="Content Placeholder 2">
+            <a:extLst>
+              <a:ext uri="{FF2B5EF4-FFF2-40B4-BE49-F238E27FC236}">
+                <a16:creationId xmlns:a16="http://schemas.microsoft.com/office/drawing/2014/main" id="{724EB45F-486F-45B9-A381-564253648764}"/>
+              </a:ext>
+            </a:extLst>
+          </p:cNvPr>
+          <p:cNvSpPr>
+            <a:spLocks noGrp="1"/>
+          </p:cNvSpPr>
+          <p:nvPr>
+            <p:ph idx="1"/>
+          </p:nvPr>
+        </p:nvSpPr>
+        <p:spPr>
+          <a:xfrm>
+            <a:off x="581192" y="2180497"/>
+            <a:ext cx="11029615" cy="1378250"/>
+          </a:xfrm>
+        </p:spPr>
+        <p:txBody>
+          <a:bodyPr/>
+          <a:lstStyle/>
+          <a:p>
+            <a:r>
+              <a:rPr lang="en-US" dirty="0"/>
+              <a:t>EF Core supports two development approaches 1) Code-First 2) Database-First. EF Core mainly targets the code-first approach and provides little support for the database-first approach because the visual designer or wizard for DB model is not supported as of EF Core 2.0.</a:t>
+            </a:r>
+          </a:p>
+        </p:txBody>
+      </p:sp>
+    </p:spTree>
+    <p:extLst>
+      <p:ext uri="{BB962C8B-B14F-4D97-AF65-F5344CB8AC3E}">
+        <p14:creationId xmlns:p14="http://schemas.microsoft.com/office/powerpoint/2010/main" val="3579096358"/>
+      </p:ext>
+    </p:extLst>
+  </p:cSld>
+  <p:clrMapOvr>
+    <a:masterClrMapping/>
+  </p:clrMapOvr>
+</p:sld>
+</file>
+
+<file path=ppt/slides/slide16.xml><?xml version="1.0" encoding="utf-8"?>
+<p:sld xmlns:a="http://schemas.openxmlformats.org/drawingml/2006/main" xmlns:r="http://schemas.openxmlformats.org/officeDocument/2006/relationships" xmlns:p="http://schemas.openxmlformats.org/presentationml/2006/main">
+  <p:cSld>
+    <p:spTree>
+      <p:nvGrpSpPr>
+        <p:cNvPr id="1" name=""/>
+        <p:cNvGrpSpPr/>
+        <p:nvPr/>
+      </p:nvGrpSpPr>
+      <p:grpSpPr>
+        <a:xfrm>
+          <a:off x="0" y="0"/>
+          <a:ext cx="0" cy="0"/>
+          <a:chOff x="0" y="0"/>
+          <a:chExt cx="0" cy="0"/>
+        </a:xfrm>
+      </p:grpSpPr>
+      <p:sp>
+        <p:nvSpPr>
+          <p:cNvPr id="2" name="Title 1">
+            <a:extLst>
+              <a:ext uri="{FF2B5EF4-FFF2-40B4-BE49-F238E27FC236}">
                 <a16:creationId xmlns:a16="http://schemas.microsoft.com/office/drawing/2014/main" id="{3B976E5A-98EA-4EEB-952A-D61EF2A071C4}"/>
               </a:ext>
             </a:extLst>
@@ -4369,39 +4624,383 @@
           <a:bodyPr/>
           <a:lstStyle/>
           <a:p>
-            <a:endParaRPr lang="en-US"/>
-          </a:p>
-        </p:txBody>
-      </p:sp>
-      <p:sp>
-        <p:nvSpPr>
-          <p:cNvPr id="3" name="Content Placeholder 2">
+            <a:r>
+              <a:rPr lang="en-US" dirty="0"/>
+              <a:t>EF Core vs EF 6</a:t>
+            </a:r>
+          </a:p>
+        </p:txBody>
+      </p:sp>
+      <p:pic>
+        <p:nvPicPr>
+          <p:cNvPr id="4" name="Picture 3">
             <a:extLst>
               <a:ext uri="{FF2B5EF4-FFF2-40B4-BE49-F238E27FC236}">
-                <a16:creationId xmlns:a16="http://schemas.microsoft.com/office/drawing/2014/main" id="{36DF882C-03A6-42E3-9205-B671B7826AD8}"/>
+                <a16:creationId xmlns:a16="http://schemas.microsoft.com/office/drawing/2014/main" id="{D1F0FF65-897C-4155-835F-9C6C3B576A80}"/>
               </a:ext>
             </a:extLst>
           </p:cNvPr>
-          <p:cNvSpPr>
-            <a:spLocks noGrp="1"/>
-          </p:cNvSpPr>
-          <p:nvPr>
-            <p:ph idx="1"/>
-          </p:nvPr>
-        </p:nvSpPr>
-        <p:spPr/>
-        <p:txBody>
-          <a:bodyPr/>
-          <a:lstStyle/>
-          <a:p>
-            <a:endParaRPr lang="en-US"/>
-          </a:p>
-        </p:txBody>
-      </p:sp>
+          <p:cNvPicPr>
+            <a:picLocks noChangeAspect="1"/>
+          </p:cNvPicPr>
+          <p:nvPr/>
+        </p:nvPicPr>
+        <p:blipFill rotWithShape="1">
+          <a:blip r:embed="rId2"/>
+          <a:srcRect r="38901" b="68205"/>
+          <a:stretch/>
+        </p:blipFill>
+        <p:spPr>
+          <a:xfrm>
+            <a:off x="657308" y="1973092"/>
+            <a:ext cx="10393796" cy="3628638"/>
+          </a:xfrm>
+          <a:prstGeom prst="rect">
+            <a:avLst/>
+          </a:prstGeom>
+        </p:spPr>
+      </p:pic>
     </p:spTree>
     <p:extLst>
       <p:ext uri="{BB962C8B-B14F-4D97-AF65-F5344CB8AC3E}">
         <p14:creationId xmlns:p14="http://schemas.microsoft.com/office/powerpoint/2010/main" val="3575724995"/>
+      </p:ext>
+    </p:extLst>
+  </p:cSld>
+  <p:clrMapOvr>
+    <a:masterClrMapping/>
+  </p:clrMapOvr>
+</p:sld>
+</file>
+
+<file path=ppt/slides/slide17.xml><?xml version="1.0" encoding="utf-8"?>
+<p:sld xmlns:a="http://schemas.openxmlformats.org/drawingml/2006/main" xmlns:r="http://schemas.openxmlformats.org/officeDocument/2006/relationships" xmlns:p="http://schemas.openxmlformats.org/presentationml/2006/main">
+  <p:cSld>
+    <p:spTree>
+      <p:nvGrpSpPr>
+        <p:cNvPr id="1" name=""/>
+        <p:cNvGrpSpPr/>
+        <p:nvPr/>
+      </p:nvGrpSpPr>
+      <p:grpSpPr>
+        <a:xfrm>
+          <a:off x="0" y="0"/>
+          <a:ext cx="0" cy="0"/>
+          <a:chOff x="0" y="0"/>
+          <a:chExt cx="0" cy="0"/>
+        </a:xfrm>
+      </p:grpSpPr>
+      <p:sp>
+        <p:nvSpPr>
+          <p:cNvPr id="2" name="Title 1">
+            <a:extLst>
+              <a:ext uri="{FF2B5EF4-FFF2-40B4-BE49-F238E27FC236}">
+                <a16:creationId xmlns:a16="http://schemas.microsoft.com/office/drawing/2014/main" id="{3B976E5A-98EA-4EEB-952A-D61EF2A071C4}"/>
+              </a:ext>
+            </a:extLst>
+          </p:cNvPr>
+          <p:cNvSpPr>
+            <a:spLocks noGrp="1"/>
+          </p:cNvSpPr>
+          <p:nvPr>
+            <p:ph type="title"/>
+          </p:nvPr>
+        </p:nvSpPr>
+        <p:spPr/>
+        <p:txBody>
+          <a:bodyPr/>
+          <a:lstStyle/>
+          <a:p>
+            <a:r>
+              <a:rPr lang="en-US" dirty="0"/>
+              <a:t>EF Core vs EF 6</a:t>
+            </a:r>
+          </a:p>
+        </p:txBody>
+      </p:sp>
+      <p:pic>
+        <p:nvPicPr>
+          <p:cNvPr id="5" name="Picture 4">
+            <a:extLst>
+              <a:ext uri="{FF2B5EF4-FFF2-40B4-BE49-F238E27FC236}">
+                <a16:creationId xmlns:a16="http://schemas.microsoft.com/office/drawing/2014/main" id="{D681CEAD-91F8-47B5-A934-1207C6ACD786}"/>
+              </a:ext>
+            </a:extLst>
+          </p:cNvPr>
+          <p:cNvPicPr>
+            <a:picLocks noChangeAspect="1"/>
+          </p:cNvPicPr>
+          <p:nvPr/>
+        </p:nvPicPr>
+        <p:blipFill rotWithShape="1">
+          <a:blip r:embed="rId2"/>
+          <a:srcRect t="33424"/>
+          <a:stretch/>
+        </p:blipFill>
+        <p:spPr>
+          <a:xfrm>
+            <a:off x="581192" y="1911178"/>
+            <a:ext cx="10473986" cy="4678115"/>
+          </a:xfrm>
+          <a:prstGeom prst="rect">
+            <a:avLst/>
+          </a:prstGeom>
+        </p:spPr>
+      </p:pic>
+    </p:spTree>
+    <p:extLst>
+      <p:ext uri="{BB962C8B-B14F-4D97-AF65-F5344CB8AC3E}">
+        <p14:creationId xmlns:p14="http://schemas.microsoft.com/office/powerpoint/2010/main" val="900951158"/>
+      </p:ext>
+    </p:extLst>
+  </p:cSld>
+  <p:clrMapOvr>
+    <a:masterClrMapping/>
+  </p:clrMapOvr>
+</p:sld>
+</file>
+
+<file path=ppt/slides/slide18.xml><?xml version="1.0" encoding="utf-8"?>
+<p:sld xmlns:a="http://schemas.openxmlformats.org/drawingml/2006/main" xmlns:r="http://schemas.openxmlformats.org/officeDocument/2006/relationships" xmlns:p="http://schemas.openxmlformats.org/presentationml/2006/main">
+  <p:cSld>
+    <p:spTree>
+      <p:nvGrpSpPr>
+        <p:cNvPr id="1" name=""/>
+        <p:cNvGrpSpPr/>
+        <p:nvPr/>
+      </p:nvGrpSpPr>
+      <p:grpSpPr>
+        <a:xfrm>
+          <a:off x="0" y="0"/>
+          <a:ext cx="0" cy="0"/>
+          <a:chOff x="0" y="0"/>
+          <a:chExt cx="0" cy="0"/>
+        </a:xfrm>
+      </p:grpSpPr>
+      <p:sp>
+        <p:nvSpPr>
+          <p:cNvPr id="2" name="Title 1">
+            <a:extLst>
+              <a:ext uri="{FF2B5EF4-FFF2-40B4-BE49-F238E27FC236}">
+                <a16:creationId xmlns:a16="http://schemas.microsoft.com/office/drawing/2014/main" id="{3B976E5A-98EA-4EEB-952A-D61EF2A071C4}"/>
+              </a:ext>
+            </a:extLst>
+          </p:cNvPr>
+          <p:cNvSpPr>
+            <a:spLocks noGrp="1"/>
+          </p:cNvSpPr>
+          <p:nvPr>
+            <p:ph type="title"/>
+          </p:nvPr>
+        </p:nvSpPr>
+        <p:spPr/>
+        <p:txBody>
+          <a:bodyPr/>
+          <a:lstStyle/>
+          <a:p>
+            <a:r>
+              <a:rPr lang="en-US" dirty="0"/>
+              <a:t>EF Core vs EF 6</a:t>
+            </a:r>
+          </a:p>
+        </p:txBody>
+      </p:sp>
+      <p:pic>
+        <p:nvPicPr>
+          <p:cNvPr id="3" name="Picture 2">
+            <a:extLst>
+              <a:ext uri="{FF2B5EF4-FFF2-40B4-BE49-F238E27FC236}">
+                <a16:creationId xmlns:a16="http://schemas.microsoft.com/office/drawing/2014/main" id="{19BF3B91-6CAA-4278-9D54-847410929A4F}"/>
+              </a:ext>
+            </a:extLst>
+          </p:cNvPr>
+          <p:cNvPicPr>
+            <a:picLocks noChangeAspect="1"/>
+          </p:cNvPicPr>
+          <p:nvPr/>
+        </p:nvPicPr>
+        <p:blipFill>
+          <a:blip r:embed="rId2"/>
+          <a:stretch>
+            <a:fillRect/>
+          </a:stretch>
+        </p:blipFill>
+        <p:spPr>
+          <a:xfrm>
+            <a:off x="581193" y="1986543"/>
+            <a:ext cx="7922636" cy="4397781"/>
+          </a:xfrm>
+          <a:prstGeom prst="rect">
+            <a:avLst/>
+          </a:prstGeom>
+        </p:spPr>
+      </p:pic>
+      <p:sp>
+        <p:nvSpPr>
+          <p:cNvPr id="6" name="TextBox 5">
+            <a:extLst>
+              <a:ext uri="{FF2B5EF4-FFF2-40B4-BE49-F238E27FC236}">
+                <a16:creationId xmlns:a16="http://schemas.microsoft.com/office/drawing/2014/main" id="{3845E489-4F0E-43CD-B881-F8A6E060BB62}"/>
+              </a:ext>
+            </a:extLst>
+          </p:cNvPr>
+          <p:cNvSpPr txBox="1"/>
+          <p:nvPr/>
+        </p:nvSpPr>
+        <p:spPr>
+          <a:xfrm>
+            <a:off x="581192" y="6458403"/>
+            <a:ext cx="5699381" cy="646331"/>
+          </a:xfrm>
+          <a:prstGeom prst="rect">
+            <a:avLst/>
+          </a:prstGeom>
+          <a:noFill/>
+        </p:spPr>
+        <p:txBody>
+          <a:bodyPr wrap="none" rtlCol="0">
+            <a:spAutoFit/>
+          </a:bodyPr>
+          <a:lstStyle/>
+          <a:p>
+            <a:r>
+              <a:rPr lang="en-US" dirty="0">
+                <a:hlinkClick r:id="rId3"/>
+              </a:rPr>
+              <a:t>https://docs.microsoft.com/en-us/ef/efcore-and-ef6/features</a:t>
+            </a:r>
+            <a:endParaRPr lang="en-US" dirty="0"/>
+          </a:p>
+          <a:p>
+            <a:endParaRPr lang="en-US" dirty="0"/>
+          </a:p>
+        </p:txBody>
+      </p:sp>
+    </p:spTree>
+    <p:extLst>
+      <p:ext uri="{BB962C8B-B14F-4D97-AF65-F5344CB8AC3E}">
+        <p14:creationId xmlns:p14="http://schemas.microsoft.com/office/powerpoint/2010/main" val="3884048652"/>
+      </p:ext>
+    </p:extLst>
+  </p:cSld>
+  <p:clrMapOvr>
+    <a:masterClrMapping/>
+  </p:clrMapOvr>
+</p:sld>
+</file>
+
+<file path=ppt/slides/slide19.xml><?xml version="1.0" encoding="utf-8"?>
+<p:sld xmlns:a="http://schemas.openxmlformats.org/drawingml/2006/main" xmlns:r="http://schemas.openxmlformats.org/officeDocument/2006/relationships" xmlns:p="http://schemas.openxmlformats.org/presentationml/2006/main">
+  <p:cSld>
+    <p:spTree>
+      <p:nvGrpSpPr>
+        <p:cNvPr id="1" name=""/>
+        <p:cNvGrpSpPr/>
+        <p:nvPr/>
+      </p:nvGrpSpPr>
+      <p:grpSpPr>
+        <a:xfrm>
+          <a:off x="0" y="0"/>
+          <a:ext cx="0" cy="0"/>
+          <a:chOff x="0" y="0"/>
+          <a:chExt cx="0" cy="0"/>
+        </a:xfrm>
+      </p:grpSpPr>
+      <p:sp>
+        <p:nvSpPr>
+          <p:cNvPr id="2" name="Title 1">
+            <a:extLst>
+              <a:ext uri="{FF2B5EF4-FFF2-40B4-BE49-F238E27FC236}">
+                <a16:creationId xmlns:a16="http://schemas.microsoft.com/office/drawing/2014/main" id="{D03FECAF-96A3-42DF-AEED-319505948530}"/>
+              </a:ext>
+            </a:extLst>
+          </p:cNvPr>
+          <p:cNvSpPr>
+            <a:spLocks noGrp="1"/>
+          </p:cNvSpPr>
+          <p:nvPr>
+            <p:ph type="title"/>
+          </p:nvPr>
+        </p:nvSpPr>
+        <p:spPr/>
+        <p:txBody>
+          <a:bodyPr/>
+          <a:lstStyle/>
+          <a:p>
+            <a:r>
+              <a:rPr lang="en-US" dirty="0"/>
+              <a:t>EF6 </a:t>
+            </a:r>
+          </a:p>
+        </p:txBody>
+      </p:sp>
+      <p:sp>
+        <p:nvSpPr>
+          <p:cNvPr id="3" name="Content Placeholder 2">
+            <a:extLst>
+              <a:ext uri="{FF2B5EF4-FFF2-40B4-BE49-F238E27FC236}">
+                <a16:creationId xmlns:a16="http://schemas.microsoft.com/office/drawing/2014/main" id="{6786EBF3-33BD-4E56-AC2E-735BE8447F33}"/>
+              </a:ext>
+            </a:extLst>
+          </p:cNvPr>
+          <p:cNvSpPr>
+            <a:spLocks noGrp="1"/>
+          </p:cNvSpPr>
+          <p:nvPr>
+            <p:ph idx="1"/>
+          </p:nvPr>
+        </p:nvSpPr>
+        <p:spPr>
+          <a:xfrm>
+            <a:off x="581192" y="2180497"/>
+            <a:ext cx="11029615" cy="1180542"/>
+          </a:xfrm>
+        </p:spPr>
+        <p:txBody>
+          <a:bodyPr/>
+          <a:lstStyle/>
+          <a:p>
+            <a:r>
+              <a:rPr lang="en-US" dirty="0"/>
+              <a:t>add Entity Data Model by right clicking on the project in the solution explorer -&gt; Add -&gt; New Item. This will open the Add New Item popup. In the popup, select ADO.NET Entity Data Model</a:t>
+            </a:r>
+          </a:p>
+        </p:txBody>
+      </p:sp>
+      <p:pic>
+        <p:nvPicPr>
+          <p:cNvPr id="5" name="Picture 4">
+            <a:extLst>
+              <a:ext uri="{FF2B5EF4-FFF2-40B4-BE49-F238E27FC236}">
+                <a16:creationId xmlns:a16="http://schemas.microsoft.com/office/drawing/2014/main" id="{7C4A0BE1-5A76-42A3-B770-638255ACF1F8}"/>
+              </a:ext>
+            </a:extLst>
+          </p:cNvPr>
+          <p:cNvPicPr>
+            <a:picLocks noChangeAspect="1"/>
+          </p:cNvPicPr>
+          <p:nvPr/>
+        </p:nvPicPr>
+        <p:blipFill>
+          <a:blip r:embed="rId2"/>
+          <a:stretch>
+            <a:fillRect/>
+          </a:stretch>
+        </p:blipFill>
+        <p:spPr>
+          <a:xfrm>
+            <a:off x="2507965" y="3074573"/>
+            <a:ext cx="5944430" cy="3620005"/>
+          </a:xfrm>
+          <a:prstGeom prst="rect">
+            <a:avLst/>
+          </a:prstGeom>
+        </p:spPr>
+      </p:pic>
+    </p:spTree>
+    <p:extLst>
+      <p:ext uri="{BB962C8B-B14F-4D97-AF65-F5344CB8AC3E}">
+        <p14:creationId xmlns:p14="http://schemas.microsoft.com/office/powerpoint/2010/main" val="2365511989"/>
       </p:ext>
     </p:extLst>
   </p:cSld>
@@ -4512,7 +5111,22 @@
             </a:r>
           </a:p>
           <a:p>
-            <a:endParaRPr lang="en-US" dirty="0"/>
+            <a:r>
+              <a:rPr lang="en-US" dirty="0"/>
+              <a:t>Entity Framework Core</a:t>
+            </a:r>
+          </a:p>
+          <a:p>
+            <a:r>
+              <a:rPr lang="en-US" dirty="0"/>
+              <a:t>EF Core vs EF 6</a:t>
+            </a:r>
+          </a:p>
+          <a:p>
+            <a:r>
+              <a:rPr lang="en-US" dirty="0"/>
+              <a:t>Assignment</a:t>
+            </a:r>
           </a:p>
           <a:p>
             <a:endParaRPr lang="en-US" dirty="0"/>
@@ -4526,6 +5140,2248 @@
     <p:extLst>
       <p:ext uri="{BB962C8B-B14F-4D97-AF65-F5344CB8AC3E}">
         <p14:creationId xmlns:p14="http://schemas.microsoft.com/office/powerpoint/2010/main" val="1627630859"/>
+      </p:ext>
+    </p:extLst>
+  </p:cSld>
+  <p:clrMapOvr>
+    <a:masterClrMapping/>
+  </p:clrMapOvr>
+</p:sld>
+</file>
+
+<file path=ppt/slides/slide20.xml><?xml version="1.0" encoding="utf-8"?>
+<p:sld xmlns:a="http://schemas.openxmlformats.org/drawingml/2006/main" xmlns:r="http://schemas.openxmlformats.org/officeDocument/2006/relationships" xmlns:p="http://schemas.openxmlformats.org/presentationml/2006/main">
+  <p:cSld>
+    <p:spTree>
+      <p:nvGrpSpPr>
+        <p:cNvPr id="1" name=""/>
+        <p:cNvGrpSpPr/>
+        <p:nvPr/>
+      </p:nvGrpSpPr>
+      <p:grpSpPr>
+        <a:xfrm>
+          <a:off x="0" y="0"/>
+          <a:ext cx="0" cy="0"/>
+          <a:chOff x="0" y="0"/>
+          <a:chExt cx="0" cy="0"/>
+        </a:xfrm>
+      </p:grpSpPr>
+      <p:sp>
+        <p:nvSpPr>
+          <p:cNvPr id="2" name="Title 1">
+            <a:extLst>
+              <a:ext uri="{FF2B5EF4-FFF2-40B4-BE49-F238E27FC236}">
+                <a16:creationId xmlns:a16="http://schemas.microsoft.com/office/drawing/2014/main" id="{D03FECAF-96A3-42DF-AEED-319505948530}"/>
+              </a:ext>
+            </a:extLst>
+          </p:cNvPr>
+          <p:cNvSpPr>
+            <a:spLocks noGrp="1"/>
+          </p:cNvSpPr>
+          <p:nvPr>
+            <p:ph type="title"/>
+          </p:nvPr>
+        </p:nvSpPr>
+        <p:spPr/>
+        <p:txBody>
+          <a:bodyPr/>
+          <a:lstStyle/>
+          <a:p>
+            <a:r>
+              <a:rPr lang="en-US" dirty="0"/>
+              <a:t>EF6 </a:t>
+            </a:r>
+          </a:p>
+        </p:txBody>
+      </p:sp>
+      <p:pic>
+        <p:nvPicPr>
+          <p:cNvPr id="8" name="Content Placeholder 7">
+            <a:extLst>
+              <a:ext uri="{FF2B5EF4-FFF2-40B4-BE49-F238E27FC236}">
+                <a16:creationId xmlns:a16="http://schemas.microsoft.com/office/drawing/2014/main" id="{A336DA70-8C7D-4C38-97B2-32E759C7030E}"/>
+              </a:ext>
+            </a:extLst>
+          </p:cNvPr>
+          <p:cNvPicPr>
+            <a:picLocks noGrp="1" noChangeAspect="1"/>
+          </p:cNvPicPr>
+          <p:nvPr>
+            <p:ph idx="1"/>
+          </p:nvPr>
+        </p:nvPicPr>
+        <p:blipFill>
+          <a:blip r:embed="rId2"/>
+          <a:stretch>
+            <a:fillRect/>
+          </a:stretch>
+        </p:blipFill>
+        <p:spPr>
+          <a:xfrm>
+            <a:off x="581192" y="1917115"/>
+            <a:ext cx="5360269" cy="4784728"/>
+          </a:xfrm>
+        </p:spPr>
+      </p:pic>
+      <p:pic>
+        <p:nvPicPr>
+          <p:cNvPr id="12" name="Picture 11">
+            <a:extLst>
+              <a:ext uri="{FF2B5EF4-FFF2-40B4-BE49-F238E27FC236}">
+                <a16:creationId xmlns:a16="http://schemas.microsoft.com/office/drawing/2014/main" id="{1164AEF5-944E-484E-B342-F19BF3FC9B2A}"/>
+              </a:ext>
+            </a:extLst>
+          </p:cNvPr>
+          <p:cNvPicPr>
+            <a:picLocks noChangeAspect="1"/>
+          </p:cNvPicPr>
+          <p:nvPr/>
+        </p:nvPicPr>
+        <p:blipFill>
+          <a:blip r:embed="rId3"/>
+          <a:stretch>
+            <a:fillRect/>
+          </a:stretch>
+        </p:blipFill>
+        <p:spPr>
+          <a:xfrm>
+            <a:off x="6178875" y="1917114"/>
+            <a:ext cx="5360269" cy="4799607"/>
+          </a:xfrm>
+          <a:prstGeom prst="rect">
+            <a:avLst/>
+          </a:prstGeom>
+        </p:spPr>
+      </p:pic>
+    </p:spTree>
+    <p:extLst>
+      <p:ext uri="{BB962C8B-B14F-4D97-AF65-F5344CB8AC3E}">
+        <p14:creationId xmlns:p14="http://schemas.microsoft.com/office/powerpoint/2010/main" val="2467669588"/>
+      </p:ext>
+    </p:extLst>
+  </p:cSld>
+  <p:clrMapOvr>
+    <a:masterClrMapping/>
+  </p:clrMapOvr>
+</p:sld>
+</file>
+
+<file path=ppt/slides/slide21.xml><?xml version="1.0" encoding="utf-8"?>
+<p:sld xmlns:a="http://schemas.openxmlformats.org/drawingml/2006/main" xmlns:r="http://schemas.openxmlformats.org/officeDocument/2006/relationships" xmlns:p="http://schemas.openxmlformats.org/presentationml/2006/main">
+  <p:cSld>
+    <p:spTree>
+      <p:nvGrpSpPr>
+        <p:cNvPr id="1" name=""/>
+        <p:cNvGrpSpPr/>
+        <p:nvPr/>
+      </p:nvGrpSpPr>
+      <p:grpSpPr>
+        <a:xfrm>
+          <a:off x="0" y="0"/>
+          <a:ext cx="0" cy="0"/>
+          <a:chOff x="0" y="0"/>
+          <a:chExt cx="0" cy="0"/>
+        </a:xfrm>
+      </p:grpSpPr>
+      <p:sp>
+        <p:nvSpPr>
+          <p:cNvPr id="2" name="Title 1">
+            <a:extLst>
+              <a:ext uri="{FF2B5EF4-FFF2-40B4-BE49-F238E27FC236}">
+                <a16:creationId xmlns:a16="http://schemas.microsoft.com/office/drawing/2014/main" id="{D03FECAF-96A3-42DF-AEED-319505948530}"/>
+              </a:ext>
+            </a:extLst>
+          </p:cNvPr>
+          <p:cNvSpPr>
+            <a:spLocks noGrp="1"/>
+          </p:cNvSpPr>
+          <p:nvPr>
+            <p:ph type="title"/>
+          </p:nvPr>
+        </p:nvSpPr>
+        <p:spPr/>
+        <p:txBody>
+          <a:bodyPr/>
+          <a:lstStyle/>
+          <a:p>
+            <a:r>
+              <a:rPr lang="en-US" dirty="0"/>
+              <a:t>EF6 </a:t>
+            </a:r>
+          </a:p>
+        </p:txBody>
+      </p:sp>
+      <p:pic>
+        <p:nvPicPr>
+          <p:cNvPr id="7" name="Picture 6">
+            <a:extLst>
+              <a:ext uri="{FF2B5EF4-FFF2-40B4-BE49-F238E27FC236}">
+                <a16:creationId xmlns:a16="http://schemas.microsoft.com/office/drawing/2014/main" id="{F372E30B-6932-480B-AC5E-39D997162A37}"/>
+              </a:ext>
+            </a:extLst>
+          </p:cNvPr>
+          <p:cNvPicPr>
+            <a:picLocks noChangeAspect="1"/>
+          </p:cNvPicPr>
+          <p:nvPr/>
+        </p:nvPicPr>
+        <p:blipFill>
+          <a:blip r:embed="rId2"/>
+          <a:stretch>
+            <a:fillRect/>
+          </a:stretch>
+        </p:blipFill>
+        <p:spPr>
+          <a:xfrm>
+            <a:off x="1334277" y="1991760"/>
+            <a:ext cx="4084950" cy="4731076"/>
+          </a:xfrm>
+          <a:prstGeom prst="rect">
+            <a:avLst/>
+          </a:prstGeom>
+        </p:spPr>
+      </p:pic>
+      <p:pic>
+        <p:nvPicPr>
+          <p:cNvPr id="9" name="Picture 8">
+            <a:extLst>
+              <a:ext uri="{FF2B5EF4-FFF2-40B4-BE49-F238E27FC236}">
+                <a16:creationId xmlns:a16="http://schemas.microsoft.com/office/drawing/2014/main" id="{9EFEBC4B-FD7B-4B36-B899-3C9B024547EE}"/>
+              </a:ext>
+            </a:extLst>
+          </p:cNvPr>
+          <p:cNvPicPr>
+            <a:picLocks noChangeAspect="1"/>
+          </p:cNvPicPr>
+          <p:nvPr/>
+        </p:nvPicPr>
+        <p:blipFill>
+          <a:blip r:embed="rId3"/>
+          <a:stretch>
+            <a:fillRect/>
+          </a:stretch>
+        </p:blipFill>
+        <p:spPr>
+          <a:xfrm>
+            <a:off x="6096000" y="1991760"/>
+            <a:ext cx="5290666" cy="4731076"/>
+          </a:xfrm>
+          <a:prstGeom prst="rect">
+            <a:avLst/>
+          </a:prstGeom>
+        </p:spPr>
+      </p:pic>
+    </p:spTree>
+    <p:extLst>
+      <p:ext uri="{BB962C8B-B14F-4D97-AF65-F5344CB8AC3E}">
+        <p14:creationId xmlns:p14="http://schemas.microsoft.com/office/powerpoint/2010/main" val="3636389848"/>
+      </p:ext>
+    </p:extLst>
+  </p:cSld>
+  <p:clrMapOvr>
+    <a:masterClrMapping/>
+  </p:clrMapOvr>
+</p:sld>
+</file>
+
+<file path=ppt/slides/slide22.xml><?xml version="1.0" encoding="utf-8"?>
+<p:sld xmlns:a="http://schemas.openxmlformats.org/drawingml/2006/main" xmlns:r="http://schemas.openxmlformats.org/officeDocument/2006/relationships" xmlns:p="http://schemas.openxmlformats.org/presentationml/2006/main">
+  <p:cSld>
+    <p:spTree>
+      <p:nvGrpSpPr>
+        <p:cNvPr id="1" name=""/>
+        <p:cNvGrpSpPr/>
+        <p:nvPr/>
+      </p:nvGrpSpPr>
+      <p:grpSpPr>
+        <a:xfrm>
+          <a:off x="0" y="0"/>
+          <a:ext cx="0" cy="0"/>
+          <a:chOff x="0" y="0"/>
+          <a:chExt cx="0" cy="0"/>
+        </a:xfrm>
+      </p:grpSpPr>
+      <p:sp>
+        <p:nvSpPr>
+          <p:cNvPr id="2" name="Title 1">
+            <a:extLst>
+              <a:ext uri="{FF2B5EF4-FFF2-40B4-BE49-F238E27FC236}">
+                <a16:creationId xmlns:a16="http://schemas.microsoft.com/office/drawing/2014/main" id="{D03FECAF-96A3-42DF-AEED-319505948530}"/>
+              </a:ext>
+            </a:extLst>
+          </p:cNvPr>
+          <p:cNvSpPr>
+            <a:spLocks noGrp="1"/>
+          </p:cNvSpPr>
+          <p:nvPr>
+            <p:ph type="title"/>
+          </p:nvPr>
+        </p:nvSpPr>
+        <p:spPr/>
+        <p:txBody>
+          <a:bodyPr/>
+          <a:lstStyle/>
+          <a:p>
+            <a:r>
+              <a:rPr lang="en-US" dirty="0"/>
+              <a:t>EF6 </a:t>
+            </a:r>
+          </a:p>
+        </p:txBody>
+      </p:sp>
+      <p:pic>
+        <p:nvPicPr>
+          <p:cNvPr id="4" name="Picture 3">
+            <a:extLst>
+              <a:ext uri="{FF2B5EF4-FFF2-40B4-BE49-F238E27FC236}">
+                <a16:creationId xmlns:a16="http://schemas.microsoft.com/office/drawing/2014/main" id="{FB833C4D-DF2C-4463-AB2F-EEF0CED151F4}"/>
+              </a:ext>
+            </a:extLst>
+          </p:cNvPr>
+          <p:cNvPicPr>
+            <a:picLocks noChangeAspect="1"/>
+          </p:cNvPicPr>
+          <p:nvPr/>
+        </p:nvPicPr>
+        <p:blipFill>
+          <a:blip r:embed="rId2"/>
+          <a:stretch>
+            <a:fillRect/>
+          </a:stretch>
+        </p:blipFill>
+        <p:spPr>
+          <a:xfrm>
+            <a:off x="581193" y="2164703"/>
+            <a:ext cx="4479268" cy="3991142"/>
+          </a:xfrm>
+          <a:prstGeom prst="rect">
+            <a:avLst/>
+          </a:prstGeom>
+        </p:spPr>
+      </p:pic>
+      <p:pic>
+        <p:nvPicPr>
+          <p:cNvPr id="6" name="Picture 5">
+            <a:extLst>
+              <a:ext uri="{FF2B5EF4-FFF2-40B4-BE49-F238E27FC236}">
+                <a16:creationId xmlns:a16="http://schemas.microsoft.com/office/drawing/2014/main" id="{B1AB9B3E-8A86-4486-BACA-179DE1B9B182}"/>
+              </a:ext>
+            </a:extLst>
+          </p:cNvPr>
+          <p:cNvPicPr>
+            <a:picLocks noChangeAspect="1"/>
+          </p:cNvPicPr>
+          <p:nvPr/>
+        </p:nvPicPr>
+        <p:blipFill>
+          <a:blip r:embed="rId3"/>
+          <a:stretch>
+            <a:fillRect/>
+          </a:stretch>
+        </p:blipFill>
+        <p:spPr>
+          <a:xfrm>
+            <a:off x="5183367" y="2164703"/>
+            <a:ext cx="6542482" cy="3191068"/>
+          </a:xfrm>
+          <a:prstGeom prst="rect">
+            <a:avLst/>
+          </a:prstGeom>
+        </p:spPr>
+      </p:pic>
+    </p:spTree>
+    <p:extLst>
+      <p:ext uri="{BB962C8B-B14F-4D97-AF65-F5344CB8AC3E}">
+        <p14:creationId xmlns:p14="http://schemas.microsoft.com/office/powerpoint/2010/main" val="2889566730"/>
+      </p:ext>
+    </p:extLst>
+  </p:cSld>
+  <p:clrMapOvr>
+    <a:masterClrMapping/>
+  </p:clrMapOvr>
+</p:sld>
+</file>
+
+<file path=ppt/slides/slide23.xml><?xml version="1.0" encoding="utf-8"?>
+<p:sld xmlns:a="http://schemas.openxmlformats.org/drawingml/2006/main" xmlns:r="http://schemas.openxmlformats.org/officeDocument/2006/relationships" xmlns:p="http://schemas.openxmlformats.org/presentationml/2006/main">
+  <p:cSld>
+    <p:spTree>
+      <p:nvGrpSpPr>
+        <p:cNvPr id="1" name=""/>
+        <p:cNvGrpSpPr/>
+        <p:nvPr/>
+      </p:nvGrpSpPr>
+      <p:grpSpPr>
+        <a:xfrm>
+          <a:off x="0" y="0"/>
+          <a:ext cx="0" cy="0"/>
+          <a:chOff x="0" y="0"/>
+          <a:chExt cx="0" cy="0"/>
+        </a:xfrm>
+      </p:grpSpPr>
+      <p:sp>
+        <p:nvSpPr>
+          <p:cNvPr id="2" name="Title 1">
+            <a:extLst>
+              <a:ext uri="{FF2B5EF4-FFF2-40B4-BE49-F238E27FC236}">
+                <a16:creationId xmlns:a16="http://schemas.microsoft.com/office/drawing/2014/main" id="{0478CBAA-27BA-47A8-AA88-F7EE381FF9E2}"/>
+              </a:ext>
+            </a:extLst>
+          </p:cNvPr>
+          <p:cNvSpPr>
+            <a:spLocks noGrp="1"/>
+          </p:cNvSpPr>
+          <p:nvPr>
+            <p:ph type="title"/>
+          </p:nvPr>
+        </p:nvSpPr>
+        <p:spPr/>
+        <p:txBody>
+          <a:bodyPr/>
+          <a:lstStyle/>
+          <a:p>
+            <a:r>
+              <a:rPr lang="en-US" dirty="0"/>
+              <a:t>EF Core</a:t>
+            </a:r>
+          </a:p>
+        </p:txBody>
+      </p:sp>
+      <p:sp>
+        <p:nvSpPr>
+          <p:cNvPr id="3" name="Content Placeholder 2">
+            <a:extLst>
+              <a:ext uri="{FF2B5EF4-FFF2-40B4-BE49-F238E27FC236}">
+                <a16:creationId xmlns:a16="http://schemas.microsoft.com/office/drawing/2014/main" id="{AC349934-B0D0-4BF9-AE75-16B68A4B0A04}"/>
+              </a:ext>
+            </a:extLst>
+          </p:cNvPr>
+          <p:cNvSpPr>
+            <a:spLocks noGrp="1"/>
+          </p:cNvSpPr>
+          <p:nvPr>
+            <p:ph idx="1"/>
+          </p:nvPr>
+        </p:nvSpPr>
+        <p:spPr>
+          <a:xfrm>
+            <a:off x="581192" y="2180497"/>
+            <a:ext cx="11029615" cy="1460628"/>
+          </a:xfrm>
+        </p:spPr>
+        <p:txBody>
+          <a:bodyPr/>
+          <a:lstStyle/>
+          <a:p>
+            <a:r>
+              <a:rPr lang="en-US" dirty="0"/>
+              <a:t>You need to install NuGet packages for the following two things to use EF Core in your application:</a:t>
+            </a:r>
+          </a:p>
+          <a:p>
+            <a:pPr lvl="1"/>
+            <a:r>
+              <a:rPr lang="en-US" dirty="0"/>
+              <a:t>1. EF Core DB provider</a:t>
+            </a:r>
+          </a:p>
+          <a:p>
+            <a:pPr lvl="1"/>
+            <a:r>
+              <a:rPr lang="en-US" dirty="0"/>
+              <a:t>2. EF Core tools</a:t>
+            </a:r>
+          </a:p>
+          <a:p>
+            <a:endParaRPr lang="en-US" dirty="0"/>
+          </a:p>
+        </p:txBody>
+      </p:sp>
+      <p:pic>
+        <p:nvPicPr>
+          <p:cNvPr id="5" name="Picture 4">
+            <a:extLst>
+              <a:ext uri="{FF2B5EF4-FFF2-40B4-BE49-F238E27FC236}">
+                <a16:creationId xmlns:a16="http://schemas.microsoft.com/office/drawing/2014/main" id="{CF5EDEDA-F9FC-4553-9D31-16D285200DCD}"/>
+              </a:ext>
+            </a:extLst>
+          </p:cNvPr>
+          <p:cNvPicPr>
+            <a:picLocks noChangeAspect="1"/>
+          </p:cNvPicPr>
+          <p:nvPr/>
+        </p:nvPicPr>
+        <p:blipFill>
+          <a:blip r:embed="rId2"/>
+          <a:stretch>
+            <a:fillRect/>
+          </a:stretch>
+        </p:blipFill>
+        <p:spPr>
+          <a:xfrm>
+            <a:off x="1464761" y="3240784"/>
+            <a:ext cx="3844357" cy="3286549"/>
+          </a:xfrm>
+          <a:prstGeom prst="rect">
+            <a:avLst/>
+          </a:prstGeom>
+        </p:spPr>
+      </p:pic>
+      <p:pic>
+        <p:nvPicPr>
+          <p:cNvPr id="7" name="Picture 6">
+            <a:extLst>
+              <a:ext uri="{FF2B5EF4-FFF2-40B4-BE49-F238E27FC236}">
+                <a16:creationId xmlns:a16="http://schemas.microsoft.com/office/drawing/2014/main" id="{D595BA66-6009-442D-BFA1-5CCE549329FE}"/>
+              </a:ext>
+            </a:extLst>
+          </p:cNvPr>
+          <p:cNvPicPr>
+            <a:picLocks noChangeAspect="1"/>
+          </p:cNvPicPr>
+          <p:nvPr/>
+        </p:nvPicPr>
+        <p:blipFill>
+          <a:blip r:embed="rId3"/>
+          <a:stretch>
+            <a:fillRect/>
+          </a:stretch>
+        </p:blipFill>
+        <p:spPr>
+          <a:xfrm>
+            <a:off x="5514807" y="3193934"/>
+            <a:ext cx="6096000" cy="3523933"/>
+          </a:xfrm>
+          <a:prstGeom prst="rect">
+            <a:avLst/>
+          </a:prstGeom>
+        </p:spPr>
+      </p:pic>
+    </p:spTree>
+    <p:extLst>
+      <p:ext uri="{BB962C8B-B14F-4D97-AF65-F5344CB8AC3E}">
+        <p14:creationId xmlns:p14="http://schemas.microsoft.com/office/powerpoint/2010/main" val="2283151828"/>
+      </p:ext>
+    </p:extLst>
+  </p:cSld>
+  <p:clrMapOvr>
+    <a:masterClrMapping/>
+  </p:clrMapOvr>
+</p:sld>
+</file>
+
+<file path=ppt/slides/slide24.xml><?xml version="1.0" encoding="utf-8"?>
+<p:sld xmlns:a="http://schemas.openxmlformats.org/drawingml/2006/main" xmlns:r="http://schemas.openxmlformats.org/officeDocument/2006/relationships" xmlns:p="http://schemas.openxmlformats.org/presentationml/2006/main">
+  <p:cSld>
+    <p:spTree>
+      <p:nvGrpSpPr>
+        <p:cNvPr id="1" name=""/>
+        <p:cNvGrpSpPr/>
+        <p:nvPr/>
+      </p:nvGrpSpPr>
+      <p:grpSpPr>
+        <a:xfrm>
+          <a:off x="0" y="0"/>
+          <a:ext cx="0" cy="0"/>
+          <a:chOff x="0" y="0"/>
+          <a:chExt cx="0" cy="0"/>
+        </a:xfrm>
+      </p:grpSpPr>
+      <p:sp>
+        <p:nvSpPr>
+          <p:cNvPr id="2" name="Title 1">
+            <a:extLst>
+              <a:ext uri="{FF2B5EF4-FFF2-40B4-BE49-F238E27FC236}">
+                <a16:creationId xmlns:a16="http://schemas.microsoft.com/office/drawing/2014/main" id="{0478CBAA-27BA-47A8-AA88-F7EE381FF9E2}"/>
+              </a:ext>
+            </a:extLst>
+          </p:cNvPr>
+          <p:cNvSpPr>
+            <a:spLocks noGrp="1"/>
+          </p:cNvSpPr>
+          <p:nvPr>
+            <p:ph type="title"/>
+          </p:nvPr>
+        </p:nvSpPr>
+        <p:spPr/>
+        <p:txBody>
+          <a:bodyPr/>
+          <a:lstStyle/>
+          <a:p>
+            <a:r>
+              <a:rPr lang="en-US" dirty="0"/>
+              <a:t>EF Core</a:t>
+            </a:r>
+          </a:p>
+        </p:txBody>
+      </p:sp>
+      <p:sp>
+        <p:nvSpPr>
+          <p:cNvPr id="3" name="Content Placeholder 2">
+            <a:extLst>
+              <a:ext uri="{FF2B5EF4-FFF2-40B4-BE49-F238E27FC236}">
+                <a16:creationId xmlns:a16="http://schemas.microsoft.com/office/drawing/2014/main" id="{AC349934-B0D0-4BF9-AE75-16B68A4B0A04}"/>
+              </a:ext>
+            </a:extLst>
+          </p:cNvPr>
+          <p:cNvSpPr>
+            <a:spLocks noGrp="1"/>
+          </p:cNvSpPr>
+          <p:nvPr>
+            <p:ph idx="1"/>
+          </p:nvPr>
+        </p:nvSpPr>
+        <p:spPr>
+          <a:xfrm>
+            <a:off x="581193" y="5092380"/>
+            <a:ext cx="11029615" cy="1530842"/>
+          </a:xfrm>
+        </p:spPr>
+        <p:txBody>
+          <a:bodyPr>
+            <a:normAutofit/>
+          </a:bodyPr>
+          <a:lstStyle/>
+          <a:p>
+            <a:pPr marL="0" indent="0">
+              <a:buNone/>
+            </a:pPr>
+            <a:r>
+              <a:rPr lang="en-US" dirty="0"/>
+              <a:t>2. EF Core tools</a:t>
+            </a:r>
+          </a:p>
+          <a:p>
+            <a:r>
+              <a:rPr lang="en-US" dirty="0" err="1"/>
+              <a:t>Microsoft.EntityFrameworkCore.Tools</a:t>
+            </a:r>
+            <a:endParaRPr lang="en-US" dirty="0"/>
+          </a:p>
+          <a:p>
+            <a:pPr lvl="1"/>
+            <a:r>
+              <a:rPr lang="en-US" dirty="0" err="1"/>
+              <a:t>Microsoft.EntityFrameworkCore.Tools.DotNet</a:t>
+            </a:r>
+            <a:endParaRPr lang="en-US" dirty="0"/>
+          </a:p>
+        </p:txBody>
+      </p:sp>
+      <p:graphicFrame>
+        <p:nvGraphicFramePr>
+          <p:cNvPr id="4" name="Table 3">
+            <a:extLst>
+              <a:ext uri="{FF2B5EF4-FFF2-40B4-BE49-F238E27FC236}">
+                <a16:creationId xmlns:a16="http://schemas.microsoft.com/office/drawing/2014/main" id="{A2B7197F-CF38-431B-B313-F3EF38B0EEC5}"/>
+              </a:ext>
+            </a:extLst>
+          </p:cNvPr>
+          <p:cNvGraphicFramePr>
+            <a:graphicFrameLocks noGrp="1"/>
+          </p:cNvGraphicFramePr>
+          <p:nvPr>
+            <p:extLst>
+              <p:ext uri="{D42A27DB-BD31-4B8C-83A1-F6EECF244321}">
+                <p14:modId xmlns:p14="http://schemas.microsoft.com/office/powerpoint/2010/main" val="3044314536"/>
+              </p:ext>
+            </p:extLst>
+          </p:nvPr>
+        </p:nvGraphicFramePr>
+        <p:xfrm>
+          <a:off x="581191" y="2594832"/>
+          <a:ext cx="9562844" cy="2405298"/>
+        </p:xfrm>
+        <a:graphic>
+          <a:graphicData uri="http://schemas.openxmlformats.org/drawingml/2006/table">
+            <a:tbl>
+              <a:tblPr/>
+              <a:tblGrid>
+                <a:gridCol w="4781422">
+                  <a:extLst>
+                    <a:ext uri="{9D8B030D-6E8A-4147-A177-3AD203B41FA5}">
+                      <a16:colId xmlns:a16="http://schemas.microsoft.com/office/drawing/2014/main" val="2333231530"/>
+                    </a:ext>
+                  </a:extLst>
+                </a:gridCol>
+                <a:gridCol w="4781422">
+                  <a:extLst>
+                    <a:ext uri="{9D8B030D-6E8A-4147-A177-3AD203B41FA5}">
+                      <a16:colId xmlns:a16="http://schemas.microsoft.com/office/drawing/2014/main" val="3436450620"/>
+                    </a:ext>
+                  </a:extLst>
+                </a:gridCol>
+              </a:tblGrid>
+              <a:tr h="338134">
+                <a:tc>
+                  <a:txBody>
+                    <a:bodyPr/>
+                    <a:lstStyle/>
+                    <a:p>
+                      <a:pPr algn="l" fontAlgn="b"/>
+                      <a:r>
+                        <a:rPr lang="en-US" sz="1700" b="0" dirty="0">
+                          <a:solidFill>
+                            <a:srgbClr val="FFFFFF"/>
+                          </a:solidFill>
+                          <a:effectLst/>
+                        </a:rPr>
+                        <a:t>Database</a:t>
+                      </a:r>
+                    </a:p>
+                  </a:txBody>
+                  <a:tcPr marL="84533" marR="84533" marT="42267" marB="42267" anchor="b">
+                    <a:lnL w="9525" cap="flat" cmpd="sng" algn="ctr">
+                      <a:solidFill>
+                        <a:srgbClr val="DFDFDF"/>
+                      </a:solidFill>
+                      <a:prstDash val="solid"/>
+                      <a:round/>
+                      <a:headEnd type="none" w="med" len="med"/>
+                      <a:tailEnd type="none" w="med" len="med"/>
+                    </a:lnL>
+                    <a:lnR w="9525" cap="flat" cmpd="sng" algn="ctr">
+                      <a:solidFill>
+                        <a:srgbClr val="DFDFDF"/>
+                      </a:solidFill>
+                      <a:prstDash val="solid"/>
+                      <a:round/>
+                      <a:headEnd type="none" w="med" len="med"/>
+                      <a:tailEnd type="none" w="med" len="med"/>
+                    </a:lnR>
+                    <a:lnT w="9525" cap="flat" cmpd="sng" algn="ctr">
+                      <a:solidFill>
+                        <a:srgbClr val="DFDFDF"/>
+                      </a:solidFill>
+                      <a:prstDash val="solid"/>
+                      <a:round/>
+                      <a:headEnd type="none" w="med" len="med"/>
+                      <a:tailEnd type="none" w="med" len="med"/>
+                    </a:lnT>
+                    <a:lnB w="9525" cap="flat" cmpd="sng" algn="ctr">
+                      <a:solidFill>
+                        <a:srgbClr val="DFDFDF"/>
+                      </a:solidFill>
+                      <a:prstDash val="solid"/>
+                      <a:round/>
+                      <a:headEnd type="none" w="med" len="med"/>
+                      <a:tailEnd type="none" w="med" len="med"/>
+                    </a:lnB>
+                    <a:solidFill>
+                      <a:srgbClr val="63A9E0"/>
+                    </a:solidFill>
+                  </a:tcPr>
+                </a:tc>
+                <a:tc>
+                  <a:txBody>
+                    <a:bodyPr/>
+                    <a:lstStyle/>
+                    <a:p>
+                      <a:pPr algn="l" fontAlgn="b"/>
+                      <a:r>
+                        <a:rPr lang="en-US" sz="1700" b="0">
+                          <a:solidFill>
+                            <a:srgbClr val="FFFFFF"/>
+                          </a:solidFill>
+                          <a:effectLst/>
+                        </a:rPr>
+                        <a:t>NuGet Package</a:t>
+                      </a:r>
+                    </a:p>
+                  </a:txBody>
+                  <a:tcPr marL="84533" marR="84533" marT="42267" marB="42267" anchor="b">
+                    <a:lnL w="9525" cap="flat" cmpd="sng" algn="ctr">
+                      <a:solidFill>
+                        <a:srgbClr val="DFDFDF"/>
+                      </a:solidFill>
+                      <a:prstDash val="solid"/>
+                      <a:round/>
+                      <a:headEnd type="none" w="med" len="med"/>
+                      <a:tailEnd type="none" w="med" len="med"/>
+                    </a:lnL>
+                    <a:lnR w="9525" cap="flat" cmpd="sng" algn="ctr">
+                      <a:solidFill>
+                        <a:srgbClr val="DFDFDF"/>
+                      </a:solidFill>
+                      <a:prstDash val="solid"/>
+                      <a:round/>
+                      <a:headEnd type="none" w="med" len="med"/>
+                      <a:tailEnd type="none" w="med" len="med"/>
+                    </a:lnR>
+                    <a:lnT w="9525" cap="flat" cmpd="sng" algn="ctr">
+                      <a:solidFill>
+                        <a:srgbClr val="DFDFDF"/>
+                      </a:solidFill>
+                      <a:prstDash val="solid"/>
+                      <a:round/>
+                      <a:headEnd type="none" w="med" len="med"/>
+                      <a:tailEnd type="none" w="med" len="med"/>
+                    </a:lnT>
+                    <a:lnB w="9525" cap="flat" cmpd="sng" algn="ctr">
+                      <a:solidFill>
+                        <a:srgbClr val="DFDFDF"/>
+                      </a:solidFill>
+                      <a:prstDash val="solid"/>
+                      <a:round/>
+                      <a:headEnd type="none" w="med" len="med"/>
+                      <a:tailEnd type="none" w="med" len="med"/>
+                    </a:lnB>
+                    <a:solidFill>
+                      <a:srgbClr val="63A9E0"/>
+                    </a:solidFill>
+                  </a:tcPr>
+                </a:tc>
+                <a:extLst>
+                  <a:ext uri="{0D108BD9-81ED-4DB2-BD59-A6C34878D82A}">
+                    <a16:rowId xmlns:a16="http://schemas.microsoft.com/office/drawing/2014/main" val="2606782527"/>
+                  </a:ext>
+                </a:extLst>
+              </a:tr>
+              <a:tr h="338134">
+                <a:tc>
+                  <a:txBody>
+                    <a:bodyPr/>
+                    <a:lstStyle/>
+                    <a:p>
+                      <a:pPr fontAlgn="t"/>
+                      <a:r>
+                        <a:rPr lang="en-US" sz="1700" dirty="0">
+                          <a:solidFill>
+                            <a:srgbClr val="414141"/>
+                          </a:solidFill>
+                          <a:effectLst/>
+                        </a:rPr>
+                        <a:t>SQL Server</a:t>
+                      </a:r>
+                    </a:p>
+                  </a:txBody>
+                  <a:tcPr marL="84533" marR="84533" marT="42267" marB="42267">
+                    <a:lnL w="9525" cap="flat" cmpd="sng" algn="ctr">
+                      <a:solidFill>
+                        <a:srgbClr val="DFDFDF"/>
+                      </a:solidFill>
+                      <a:prstDash val="solid"/>
+                      <a:round/>
+                      <a:headEnd type="none" w="med" len="med"/>
+                      <a:tailEnd type="none" w="med" len="med"/>
+                    </a:lnL>
+                    <a:lnR w="9525" cap="flat" cmpd="sng" algn="ctr">
+                      <a:solidFill>
+                        <a:srgbClr val="DFDFDF"/>
+                      </a:solidFill>
+                      <a:prstDash val="solid"/>
+                      <a:round/>
+                      <a:headEnd type="none" w="med" len="med"/>
+                      <a:tailEnd type="none" w="med" len="med"/>
+                    </a:lnR>
+                    <a:lnT w="9525" cap="flat" cmpd="sng" algn="ctr">
+                      <a:solidFill>
+                        <a:srgbClr val="DFDFDF"/>
+                      </a:solidFill>
+                      <a:prstDash val="solid"/>
+                      <a:round/>
+                      <a:headEnd type="none" w="med" len="med"/>
+                      <a:tailEnd type="none" w="med" len="med"/>
+                    </a:lnT>
+                    <a:lnB w="9525" cap="flat" cmpd="sng" algn="ctr">
+                      <a:solidFill>
+                        <a:srgbClr val="DFDFDF"/>
+                      </a:solidFill>
+                      <a:prstDash val="solid"/>
+                      <a:round/>
+                      <a:headEnd type="none" w="med" len="med"/>
+                      <a:tailEnd type="none" w="med" len="med"/>
+                    </a:lnB>
+                    <a:solidFill>
+                      <a:srgbClr val="FFFFFF"/>
+                    </a:solidFill>
+                  </a:tcPr>
+                </a:tc>
+                <a:tc>
+                  <a:txBody>
+                    <a:bodyPr/>
+                    <a:lstStyle/>
+                    <a:p>
+                      <a:pPr fontAlgn="t"/>
+                      <a:r>
+                        <a:rPr lang="en-US" sz="1700" u="none" strike="noStrike">
+                          <a:solidFill>
+                            <a:srgbClr val="007BFF"/>
+                          </a:solidFill>
+                          <a:effectLst/>
+                          <a:hlinkClick r:id="rId2"/>
+                        </a:rPr>
+                        <a:t>Microsoft.EntityFrameworkCore.SqlServer</a:t>
+                      </a:r>
+                      <a:endParaRPr lang="en-US" sz="1700">
+                        <a:solidFill>
+                          <a:srgbClr val="414141"/>
+                        </a:solidFill>
+                        <a:effectLst/>
+                      </a:endParaRPr>
+                    </a:p>
+                  </a:txBody>
+                  <a:tcPr marL="84533" marR="84533" marT="42267" marB="42267">
+                    <a:lnL w="9525" cap="flat" cmpd="sng" algn="ctr">
+                      <a:solidFill>
+                        <a:srgbClr val="DFDFDF"/>
+                      </a:solidFill>
+                      <a:prstDash val="solid"/>
+                      <a:round/>
+                      <a:headEnd type="none" w="med" len="med"/>
+                      <a:tailEnd type="none" w="med" len="med"/>
+                    </a:lnL>
+                    <a:lnR w="9525" cap="flat" cmpd="sng" algn="ctr">
+                      <a:solidFill>
+                        <a:srgbClr val="DFDFDF"/>
+                      </a:solidFill>
+                      <a:prstDash val="solid"/>
+                      <a:round/>
+                      <a:headEnd type="none" w="med" len="med"/>
+                      <a:tailEnd type="none" w="med" len="med"/>
+                    </a:lnR>
+                    <a:lnT w="9525" cap="flat" cmpd="sng" algn="ctr">
+                      <a:solidFill>
+                        <a:srgbClr val="DFDFDF"/>
+                      </a:solidFill>
+                      <a:prstDash val="solid"/>
+                      <a:round/>
+                      <a:headEnd type="none" w="med" len="med"/>
+                      <a:tailEnd type="none" w="med" len="med"/>
+                    </a:lnT>
+                    <a:lnB w="9525" cap="flat" cmpd="sng" algn="ctr">
+                      <a:solidFill>
+                        <a:srgbClr val="DFDFDF"/>
+                      </a:solidFill>
+                      <a:prstDash val="solid"/>
+                      <a:round/>
+                      <a:headEnd type="none" w="med" len="med"/>
+                      <a:tailEnd type="none" w="med" len="med"/>
+                    </a:lnB>
+                    <a:solidFill>
+                      <a:srgbClr val="FFFFFF"/>
+                    </a:solidFill>
+                  </a:tcPr>
+                </a:tc>
+                <a:extLst>
+                  <a:ext uri="{0D108BD9-81ED-4DB2-BD59-A6C34878D82A}">
+                    <a16:rowId xmlns:a16="http://schemas.microsoft.com/office/drawing/2014/main" val="3629103050"/>
+                  </a:ext>
+                </a:extLst>
+              </a:tr>
+              <a:tr h="338134">
+                <a:tc>
+                  <a:txBody>
+                    <a:bodyPr/>
+                    <a:lstStyle/>
+                    <a:p>
+                      <a:pPr fontAlgn="t"/>
+                      <a:r>
+                        <a:rPr lang="en-US" sz="1700">
+                          <a:solidFill>
+                            <a:srgbClr val="414141"/>
+                          </a:solidFill>
+                          <a:effectLst/>
+                        </a:rPr>
+                        <a:t>MySQL</a:t>
+                      </a:r>
+                    </a:p>
+                  </a:txBody>
+                  <a:tcPr marL="84533" marR="84533" marT="42267" marB="42267">
+                    <a:lnL w="9525" cap="flat" cmpd="sng" algn="ctr">
+                      <a:solidFill>
+                        <a:srgbClr val="DFDFDF"/>
+                      </a:solidFill>
+                      <a:prstDash val="solid"/>
+                      <a:round/>
+                      <a:headEnd type="none" w="med" len="med"/>
+                      <a:tailEnd type="none" w="med" len="med"/>
+                    </a:lnL>
+                    <a:lnR w="9525" cap="flat" cmpd="sng" algn="ctr">
+                      <a:solidFill>
+                        <a:srgbClr val="DFDFDF"/>
+                      </a:solidFill>
+                      <a:prstDash val="solid"/>
+                      <a:round/>
+                      <a:headEnd type="none" w="med" len="med"/>
+                      <a:tailEnd type="none" w="med" len="med"/>
+                    </a:lnR>
+                    <a:lnT w="9525" cap="flat" cmpd="sng" algn="ctr">
+                      <a:solidFill>
+                        <a:srgbClr val="DFDFDF"/>
+                      </a:solidFill>
+                      <a:prstDash val="solid"/>
+                      <a:round/>
+                      <a:headEnd type="none" w="med" len="med"/>
+                      <a:tailEnd type="none" w="med" len="med"/>
+                    </a:lnT>
+                    <a:lnB w="9525" cap="flat" cmpd="sng" algn="ctr">
+                      <a:solidFill>
+                        <a:srgbClr val="DFDFDF"/>
+                      </a:solidFill>
+                      <a:prstDash val="solid"/>
+                      <a:round/>
+                      <a:headEnd type="none" w="med" len="med"/>
+                      <a:tailEnd type="none" w="med" len="med"/>
+                    </a:lnB>
+                    <a:solidFill>
+                      <a:srgbClr val="F9F9F9"/>
+                    </a:solidFill>
+                  </a:tcPr>
+                </a:tc>
+                <a:tc>
+                  <a:txBody>
+                    <a:bodyPr/>
+                    <a:lstStyle/>
+                    <a:p>
+                      <a:pPr fontAlgn="t"/>
+                      <a:r>
+                        <a:rPr lang="en-US" sz="1700" u="none" strike="noStrike">
+                          <a:solidFill>
+                            <a:srgbClr val="007BFF"/>
+                          </a:solidFill>
+                          <a:effectLst/>
+                          <a:hlinkClick r:id="rId3"/>
+                        </a:rPr>
+                        <a:t>MySql.Data.EntityFrameworkCore</a:t>
+                      </a:r>
+                      <a:endParaRPr lang="en-US" sz="1700">
+                        <a:solidFill>
+                          <a:srgbClr val="414141"/>
+                        </a:solidFill>
+                        <a:effectLst/>
+                      </a:endParaRPr>
+                    </a:p>
+                  </a:txBody>
+                  <a:tcPr marL="84533" marR="84533" marT="42267" marB="42267">
+                    <a:lnL w="9525" cap="flat" cmpd="sng" algn="ctr">
+                      <a:solidFill>
+                        <a:srgbClr val="DFDFDF"/>
+                      </a:solidFill>
+                      <a:prstDash val="solid"/>
+                      <a:round/>
+                      <a:headEnd type="none" w="med" len="med"/>
+                      <a:tailEnd type="none" w="med" len="med"/>
+                    </a:lnL>
+                    <a:lnR w="9525" cap="flat" cmpd="sng" algn="ctr">
+                      <a:solidFill>
+                        <a:srgbClr val="DFDFDF"/>
+                      </a:solidFill>
+                      <a:prstDash val="solid"/>
+                      <a:round/>
+                      <a:headEnd type="none" w="med" len="med"/>
+                      <a:tailEnd type="none" w="med" len="med"/>
+                    </a:lnR>
+                    <a:lnT w="9525" cap="flat" cmpd="sng" algn="ctr">
+                      <a:solidFill>
+                        <a:srgbClr val="DFDFDF"/>
+                      </a:solidFill>
+                      <a:prstDash val="solid"/>
+                      <a:round/>
+                      <a:headEnd type="none" w="med" len="med"/>
+                      <a:tailEnd type="none" w="med" len="med"/>
+                    </a:lnT>
+                    <a:lnB w="9525" cap="flat" cmpd="sng" algn="ctr">
+                      <a:solidFill>
+                        <a:srgbClr val="DFDFDF"/>
+                      </a:solidFill>
+                      <a:prstDash val="solid"/>
+                      <a:round/>
+                      <a:headEnd type="none" w="med" len="med"/>
+                      <a:tailEnd type="none" w="med" len="med"/>
+                    </a:lnB>
+                    <a:solidFill>
+                      <a:srgbClr val="F9F9F9"/>
+                    </a:solidFill>
+                  </a:tcPr>
+                </a:tc>
+                <a:extLst>
+                  <a:ext uri="{0D108BD9-81ED-4DB2-BD59-A6C34878D82A}">
+                    <a16:rowId xmlns:a16="http://schemas.microsoft.com/office/drawing/2014/main" val="2944042791"/>
+                  </a:ext>
+                </a:extLst>
+              </a:tr>
+              <a:tr h="338134">
+                <a:tc>
+                  <a:txBody>
+                    <a:bodyPr/>
+                    <a:lstStyle/>
+                    <a:p>
+                      <a:pPr fontAlgn="t"/>
+                      <a:r>
+                        <a:rPr lang="en-US" sz="1700">
+                          <a:solidFill>
+                            <a:srgbClr val="414141"/>
+                          </a:solidFill>
+                          <a:effectLst/>
+                        </a:rPr>
+                        <a:t>PostgreSQL</a:t>
+                      </a:r>
+                    </a:p>
+                  </a:txBody>
+                  <a:tcPr marL="84533" marR="84533" marT="42267" marB="42267">
+                    <a:lnL w="9525" cap="flat" cmpd="sng" algn="ctr">
+                      <a:solidFill>
+                        <a:srgbClr val="DFDFDF"/>
+                      </a:solidFill>
+                      <a:prstDash val="solid"/>
+                      <a:round/>
+                      <a:headEnd type="none" w="med" len="med"/>
+                      <a:tailEnd type="none" w="med" len="med"/>
+                    </a:lnL>
+                    <a:lnR w="9525" cap="flat" cmpd="sng" algn="ctr">
+                      <a:solidFill>
+                        <a:srgbClr val="DFDFDF"/>
+                      </a:solidFill>
+                      <a:prstDash val="solid"/>
+                      <a:round/>
+                      <a:headEnd type="none" w="med" len="med"/>
+                      <a:tailEnd type="none" w="med" len="med"/>
+                    </a:lnR>
+                    <a:lnT w="9525" cap="flat" cmpd="sng" algn="ctr">
+                      <a:solidFill>
+                        <a:srgbClr val="DFDFDF"/>
+                      </a:solidFill>
+                      <a:prstDash val="solid"/>
+                      <a:round/>
+                      <a:headEnd type="none" w="med" len="med"/>
+                      <a:tailEnd type="none" w="med" len="med"/>
+                    </a:lnT>
+                    <a:lnB w="9525" cap="flat" cmpd="sng" algn="ctr">
+                      <a:solidFill>
+                        <a:srgbClr val="DFDFDF"/>
+                      </a:solidFill>
+                      <a:prstDash val="solid"/>
+                      <a:round/>
+                      <a:headEnd type="none" w="med" len="med"/>
+                      <a:tailEnd type="none" w="med" len="med"/>
+                    </a:lnB>
+                    <a:solidFill>
+                      <a:srgbClr val="FFFFFF"/>
+                    </a:solidFill>
+                  </a:tcPr>
+                </a:tc>
+                <a:tc>
+                  <a:txBody>
+                    <a:bodyPr/>
+                    <a:lstStyle/>
+                    <a:p>
+                      <a:pPr fontAlgn="t"/>
+                      <a:r>
+                        <a:rPr lang="en-US" sz="1700" u="none" strike="noStrike">
+                          <a:solidFill>
+                            <a:srgbClr val="007BFF"/>
+                          </a:solidFill>
+                          <a:effectLst/>
+                          <a:hlinkClick r:id="rId4"/>
+                        </a:rPr>
+                        <a:t>Npgsql.EntityFrameworkCore.PostgreSQL</a:t>
+                      </a:r>
+                      <a:endParaRPr lang="en-US" sz="1700">
+                        <a:solidFill>
+                          <a:srgbClr val="414141"/>
+                        </a:solidFill>
+                        <a:effectLst/>
+                      </a:endParaRPr>
+                    </a:p>
+                  </a:txBody>
+                  <a:tcPr marL="84533" marR="84533" marT="42267" marB="42267">
+                    <a:lnL w="9525" cap="flat" cmpd="sng" algn="ctr">
+                      <a:solidFill>
+                        <a:srgbClr val="DFDFDF"/>
+                      </a:solidFill>
+                      <a:prstDash val="solid"/>
+                      <a:round/>
+                      <a:headEnd type="none" w="med" len="med"/>
+                      <a:tailEnd type="none" w="med" len="med"/>
+                    </a:lnL>
+                    <a:lnR w="9525" cap="flat" cmpd="sng" algn="ctr">
+                      <a:solidFill>
+                        <a:srgbClr val="DFDFDF"/>
+                      </a:solidFill>
+                      <a:prstDash val="solid"/>
+                      <a:round/>
+                      <a:headEnd type="none" w="med" len="med"/>
+                      <a:tailEnd type="none" w="med" len="med"/>
+                    </a:lnR>
+                    <a:lnT w="9525" cap="flat" cmpd="sng" algn="ctr">
+                      <a:solidFill>
+                        <a:srgbClr val="DFDFDF"/>
+                      </a:solidFill>
+                      <a:prstDash val="solid"/>
+                      <a:round/>
+                      <a:headEnd type="none" w="med" len="med"/>
+                      <a:tailEnd type="none" w="med" len="med"/>
+                    </a:lnT>
+                    <a:lnB w="9525" cap="flat" cmpd="sng" algn="ctr">
+                      <a:solidFill>
+                        <a:srgbClr val="DFDFDF"/>
+                      </a:solidFill>
+                      <a:prstDash val="solid"/>
+                      <a:round/>
+                      <a:headEnd type="none" w="med" len="med"/>
+                      <a:tailEnd type="none" w="med" len="med"/>
+                    </a:lnB>
+                    <a:solidFill>
+                      <a:srgbClr val="FFFFFF"/>
+                    </a:solidFill>
+                  </a:tcPr>
+                </a:tc>
+                <a:extLst>
+                  <a:ext uri="{0D108BD9-81ED-4DB2-BD59-A6C34878D82A}">
+                    <a16:rowId xmlns:a16="http://schemas.microsoft.com/office/drawing/2014/main" val="2170345371"/>
+                  </a:ext>
+                </a:extLst>
+              </a:tr>
+              <a:tr h="338134">
+                <a:tc>
+                  <a:txBody>
+                    <a:bodyPr/>
+                    <a:lstStyle/>
+                    <a:p>
+                      <a:pPr fontAlgn="t"/>
+                      <a:r>
+                        <a:rPr lang="en-US" sz="1700">
+                          <a:solidFill>
+                            <a:srgbClr val="414141"/>
+                          </a:solidFill>
+                          <a:effectLst/>
+                        </a:rPr>
+                        <a:t>SQLite</a:t>
+                      </a:r>
+                    </a:p>
+                  </a:txBody>
+                  <a:tcPr marL="84533" marR="84533" marT="42267" marB="42267">
+                    <a:lnL w="9525" cap="flat" cmpd="sng" algn="ctr">
+                      <a:solidFill>
+                        <a:srgbClr val="DFDFDF"/>
+                      </a:solidFill>
+                      <a:prstDash val="solid"/>
+                      <a:round/>
+                      <a:headEnd type="none" w="med" len="med"/>
+                      <a:tailEnd type="none" w="med" len="med"/>
+                    </a:lnL>
+                    <a:lnR w="9525" cap="flat" cmpd="sng" algn="ctr">
+                      <a:solidFill>
+                        <a:srgbClr val="DFDFDF"/>
+                      </a:solidFill>
+                      <a:prstDash val="solid"/>
+                      <a:round/>
+                      <a:headEnd type="none" w="med" len="med"/>
+                      <a:tailEnd type="none" w="med" len="med"/>
+                    </a:lnR>
+                    <a:lnT w="9525" cap="flat" cmpd="sng" algn="ctr">
+                      <a:solidFill>
+                        <a:srgbClr val="DFDFDF"/>
+                      </a:solidFill>
+                      <a:prstDash val="solid"/>
+                      <a:round/>
+                      <a:headEnd type="none" w="med" len="med"/>
+                      <a:tailEnd type="none" w="med" len="med"/>
+                    </a:lnT>
+                    <a:lnB w="9525" cap="flat" cmpd="sng" algn="ctr">
+                      <a:solidFill>
+                        <a:srgbClr val="DFDFDF"/>
+                      </a:solidFill>
+                      <a:prstDash val="solid"/>
+                      <a:round/>
+                      <a:headEnd type="none" w="med" len="med"/>
+                      <a:tailEnd type="none" w="med" len="med"/>
+                    </a:lnB>
+                    <a:solidFill>
+                      <a:srgbClr val="F9F9F9"/>
+                    </a:solidFill>
+                  </a:tcPr>
+                </a:tc>
+                <a:tc>
+                  <a:txBody>
+                    <a:bodyPr/>
+                    <a:lstStyle/>
+                    <a:p>
+                      <a:pPr fontAlgn="t"/>
+                      <a:r>
+                        <a:rPr lang="en-US" sz="1700" u="none" strike="noStrike">
+                          <a:solidFill>
+                            <a:srgbClr val="007BFF"/>
+                          </a:solidFill>
+                          <a:effectLst/>
+                          <a:hlinkClick r:id="rId5"/>
+                        </a:rPr>
+                        <a:t>Microsoft.EntityFrameworkCore.SQLite</a:t>
+                      </a:r>
+                      <a:endParaRPr lang="en-US" sz="1700">
+                        <a:solidFill>
+                          <a:srgbClr val="414141"/>
+                        </a:solidFill>
+                        <a:effectLst/>
+                      </a:endParaRPr>
+                    </a:p>
+                  </a:txBody>
+                  <a:tcPr marL="84533" marR="84533" marT="42267" marB="42267">
+                    <a:lnL w="9525" cap="flat" cmpd="sng" algn="ctr">
+                      <a:solidFill>
+                        <a:srgbClr val="DFDFDF"/>
+                      </a:solidFill>
+                      <a:prstDash val="solid"/>
+                      <a:round/>
+                      <a:headEnd type="none" w="med" len="med"/>
+                      <a:tailEnd type="none" w="med" len="med"/>
+                    </a:lnL>
+                    <a:lnR w="9525" cap="flat" cmpd="sng" algn="ctr">
+                      <a:solidFill>
+                        <a:srgbClr val="DFDFDF"/>
+                      </a:solidFill>
+                      <a:prstDash val="solid"/>
+                      <a:round/>
+                      <a:headEnd type="none" w="med" len="med"/>
+                      <a:tailEnd type="none" w="med" len="med"/>
+                    </a:lnR>
+                    <a:lnT w="9525" cap="flat" cmpd="sng" algn="ctr">
+                      <a:solidFill>
+                        <a:srgbClr val="DFDFDF"/>
+                      </a:solidFill>
+                      <a:prstDash val="solid"/>
+                      <a:round/>
+                      <a:headEnd type="none" w="med" len="med"/>
+                      <a:tailEnd type="none" w="med" len="med"/>
+                    </a:lnT>
+                    <a:lnB w="9525" cap="flat" cmpd="sng" algn="ctr">
+                      <a:solidFill>
+                        <a:srgbClr val="DFDFDF"/>
+                      </a:solidFill>
+                      <a:prstDash val="solid"/>
+                      <a:round/>
+                      <a:headEnd type="none" w="med" len="med"/>
+                      <a:tailEnd type="none" w="med" len="med"/>
+                    </a:lnB>
+                    <a:solidFill>
+                      <a:srgbClr val="F9F9F9"/>
+                    </a:solidFill>
+                  </a:tcPr>
+                </a:tc>
+                <a:extLst>
+                  <a:ext uri="{0D108BD9-81ED-4DB2-BD59-A6C34878D82A}">
+                    <a16:rowId xmlns:a16="http://schemas.microsoft.com/office/drawing/2014/main" val="273796339"/>
+                  </a:ext>
+                </a:extLst>
+              </a:tr>
+              <a:tr h="338134">
+                <a:tc>
+                  <a:txBody>
+                    <a:bodyPr/>
+                    <a:lstStyle/>
+                    <a:p>
+                      <a:pPr fontAlgn="t"/>
+                      <a:r>
+                        <a:rPr lang="en-US" sz="1700">
+                          <a:solidFill>
+                            <a:srgbClr val="414141"/>
+                          </a:solidFill>
+                          <a:effectLst/>
+                        </a:rPr>
+                        <a:t>SQL Compact</a:t>
+                      </a:r>
+                    </a:p>
+                  </a:txBody>
+                  <a:tcPr marL="84533" marR="84533" marT="42267" marB="42267">
+                    <a:lnL w="9525" cap="flat" cmpd="sng" algn="ctr">
+                      <a:solidFill>
+                        <a:srgbClr val="DFDFDF"/>
+                      </a:solidFill>
+                      <a:prstDash val="solid"/>
+                      <a:round/>
+                      <a:headEnd type="none" w="med" len="med"/>
+                      <a:tailEnd type="none" w="med" len="med"/>
+                    </a:lnL>
+                    <a:lnR w="9525" cap="flat" cmpd="sng" algn="ctr">
+                      <a:solidFill>
+                        <a:srgbClr val="DFDFDF"/>
+                      </a:solidFill>
+                      <a:prstDash val="solid"/>
+                      <a:round/>
+                      <a:headEnd type="none" w="med" len="med"/>
+                      <a:tailEnd type="none" w="med" len="med"/>
+                    </a:lnR>
+                    <a:lnT w="9525" cap="flat" cmpd="sng" algn="ctr">
+                      <a:solidFill>
+                        <a:srgbClr val="DFDFDF"/>
+                      </a:solidFill>
+                      <a:prstDash val="solid"/>
+                      <a:round/>
+                      <a:headEnd type="none" w="med" len="med"/>
+                      <a:tailEnd type="none" w="med" len="med"/>
+                    </a:lnT>
+                    <a:lnB w="9525" cap="flat" cmpd="sng" algn="ctr">
+                      <a:solidFill>
+                        <a:srgbClr val="DFDFDF"/>
+                      </a:solidFill>
+                      <a:prstDash val="solid"/>
+                      <a:round/>
+                      <a:headEnd type="none" w="med" len="med"/>
+                      <a:tailEnd type="none" w="med" len="med"/>
+                    </a:lnB>
+                    <a:solidFill>
+                      <a:srgbClr val="FFFFFF"/>
+                    </a:solidFill>
+                  </a:tcPr>
+                </a:tc>
+                <a:tc>
+                  <a:txBody>
+                    <a:bodyPr/>
+                    <a:lstStyle/>
+                    <a:p>
+                      <a:pPr fontAlgn="t"/>
+                      <a:r>
+                        <a:rPr lang="en-US" sz="1700" u="none" strike="noStrike">
+                          <a:solidFill>
+                            <a:srgbClr val="007BFF"/>
+                          </a:solidFill>
+                          <a:effectLst/>
+                          <a:hlinkClick r:id="rId6"/>
+                        </a:rPr>
+                        <a:t>EntityFrameworkCore.SqlServerCompact40</a:t>
+                      </a:r>
+                      <a:endParaRPr lang="en-US" sz="1700">
+                        <a:solidFill>
+                          <a:srgbClr val="414141"/>
+                        </a:solidFill>
+                        <a:effectLst/>
+                      </a:endParaRPr>
+                    </a:p>
+                  </a:txBody>
+                  <a:tcPr marL="84533" marR="84533" marT="42267" marB="42267">
+                    <a:lnL w="9525" cap="flat" cmpd="sng" algn="ctr">
+                      <a:solidFill>
+                        <a:srgbClr val="DFDFDF"/>
+                      </a:solidFill>
+                      <a:prstDash val="solid"/>
+                      <a:round/>
+                      <a:headEnd type="none" w="med" len="med"/>
+                      <a:tailEnd type="none" w="med" len="med"/>
+                    </a:lnL>
+                    <a:lnR w="9525" cap="flat" cmpd="sng" algn="ctr">
+                      <a:solidFill>
+                        <a:srgbClr val="DFDFDF"/>
+                      </a:solidFill>
+                      <a:prstDash val="solid"/>
+                      <a:round/>
+                      <a:headEnd type="none" w="med" len="med"/>
+                      <a:tailEnd type="none" w="med" len="med"/>
+                    </a:lnR>
+                    <a:lnT w="9525" cap="flat" cmpd="sng" algn="ctr">
+                      <a:solidFill>
+                        <a:srgbClr val="DFDFDF"/>
+                      </a:solidFill>
+                      <a:prstDash val="solid"/>
+                      <a:round/>
+                      <a:headEnd type="none" w="med" len="med"/>
+                      <a:tailEnd type="none" w="med" len="med"/>
+                    </a:lnT>
+                    <a:lnB w="9525" cap="flat" cmpd="sng" algn="ctr">
+                      <a:solidFill>
+                        <a:srgbClr val="DFDFDF"/>
+                      </a:solidFill>
+                      <a:prstDash val="solid"/>
+                      <a:round/>
+                      <a:headEnd type="none" w="med" len="med"/>
+                      <a:tailEnd type="none" w="med" len="med"/>
+                    </a:lnB>
+                    <a:solidFill>
+                      <a:srgbClr val="FFFFFF"/>
+                    </a:solidFill>
+                  </a:tcPr>
+                </a:tc>
+                <a:extLst>
+                  <a:ext uri="{0D108BD9-81ED-4DB2-BD59-A6C34878D82A}">
+                    <a16:rowId xmlns:a16="http://schemas.microsoft.com/office/drawing/2014/main" val="40145668"/>
+                  </a:ext>
+                </a:extLst>
+              </a:tr>
+              <a:tr h="338134">
+                <a:tc>
+                  <a:txBody>
+                    <a:bodyPr/>
+                    <a:lstStyle/>
+                    <a:p>
+                      <a:pPr fontAlgn="t"/>
+                      <a:r>
+                        <a:rPr lang="en-US" sz="1700">
+                          <a:solidFill>
+                            <a:srgbClr val="414141"/>
+                          </a:solidFill>
+                          <a:effectLst/>
+                        </a:rPr>
+                        <a:t>In-memory</a:t>
+                      </a:r>
+                    </a:p>
+                  </a:txBody>
+                  <a:tcPr marL="84533" marR="84533" marT="42267" marB="42267">
+                    <a:lnL w="9525" cap="flat" cmpd="sng" algn="ctr">
+                      <a:solidFill>
+                        <a:srgbClr val="DFDFDF"/>
+                      </a:solidFill>
+                      <a:prstDash val="solid"/>
+                      <a:round/>
+                      <a:headEnd type="none" w="med" len="med"/>
+                      <a:tailEnd type="none" w="med" len="med"/>
+                    </a:lnL>
+                    <a:lnR w="9525" cap="flat" cmpd="sng" algn="ctr">
+                      <a:solidFill>
+                        <a:srgbClr val="DFDFDF"/>
+                      </a:solidFill>
+                      <a:prstDash val="solid"/>
+                      <a:round/>
+                      <a:headEnd type="none" w="med" len="med"/>
+                      <a:tailEnd type="none" w="med" len="med"/>
+                    </a:lnR>
+                    <a:lnT w="9525" cap="flat" cmpd="sng" algn="ctr">
+                      <a:solidFill>
+                        <a:srgbClr val="DFDFDF"/>
+                      </a:solidFill>
+                      <a:prstDash val="solid"/>
+                      <a:round/>
+                      <a:headEnd type="none" w="med" len="med"/>
+                      <a:tailEnd type="none" w="med" len="med"/>
+                    </a:lnT>
+                    <a:lnB w="9525" cap="flat" cmpd="sng" algn="ctr">
+                      <a:solidFill>
+                        <a:srgbClr val="DFDFDF"/>
+                      </a:solidFill>
+                      <a:prstDash val="solid"/>
+                      <a:round/>
+                      <a:headEnd type="none" w="med" len="med"/>
+                      <a:tailEnd type="none" w="med" len="med"/>
+                    </a:lnB>
+                    <a:solidFill>
+                      <a:srgbClr val="F9F9F9"/>
+                    </a:solidFill>
+                  </a:tcPr>
+                </a:tc>
+                <a:tc>
+                  <a:txBody>
+                    <a:bodyPr/>
+                    <a:lstStyle/>
+                    <a:p>
+                      <a:pPr fontAlgn="t"/>
+                      <a:r>
+                        <a:rPr lang="en-US" sz="1700" u="none" strike="noStrike" dirty="0" err="1">
+                          <a:solidFill>
+                            <a:srgbClr val="007BFF"/>
+                          </a:solidFill>
+                          <a:effectLst/>
+                          <a:hlinkClick r:id="rId7"/>
+                        </a:rPr>
+                        <a:t>Microsoft.EntityFrameworkCore.InMemory</a:t>
+                      </a:r>
+                      <a:endParaRPr lang="en-US" sz="1700" dirty="0">
+                        <a:solidFill>
+                          <a:srgbClr val="414141"/>
+                        </a:solidFill>
+                        <a:effectLst/>
+                      </a:endParaRPr>
+                    </a:p>
+                  </a:txBody>
+                  <a:tcPr marL="84533" marR="84533" marT="42267" marB="42267">
+                    <a:lnL w="9525" cap="flat" cmpd="sng" algn="ctr">
+                      <a:solidFill>
+                        <a:srgbClr val="DFDFDF"/>
+                      </a:solidFill>
+                      <a:prstDash val="solid"/>
+                      <a:round/>
+                      <a:headEnd type="none" w="med" len="med"/>
+                      <a:tailEnd type="none" w="med" len="med"/>
+                    </a:lnL>
+                    <a:lnR w="9525" cap="flat" cmpd="sng" algn="ctr">
+                      <a:solidFill>
+                        <a:srgbClr val="DFDFDF"/>
+                      </a:solidFill>
+                      <a:prstDash val="solid"/>
+                      <a:round/>
+                      <a:headEnd type="none" w="med" len="med"/>
+                      <a:tailEnd type="none" w="med" len="med"/>
+                    </a:lnR>
+                    <a:lnT w="9525" cap="flat" cmpd="sng" algn="ctr">
+                      <a:solidFill>
+                        <a:srgbClr val="DFDFDF"/>
+                      </a:solidFill>
+                      <a:prstDash val="solid"/>
+                      <a:round/>
+                      <a:headEnd type="none" w="med" len="med"/>
+                      <a:tailEnd type="none" w="med" len="med"/>
+                    </a:lnT>
+                    <a:lnB w="9525" cap="flat" cmpd="sng" algn="ctr">
+                      <a:solidFill>
+                        <a:srgbClr val="DFDFDF"/>
+                      </a:solidFill>
+                      <a:prstDash val="solid"/>
+                      <a:round/>
+                      <a:headEnd type="none" w="med" len="med"/>
+                      <a:tailEnd type="none" w="med" len="med"/>
+                    </a:lnB>
+                    <a:solidFill>
+                      <a:srgbClr val="F9F9F9"/>
+                    </a:solidFill>
+                  </a:tcPr>
+                </a:tc>
+                <a:extLst>
+                  <a:ext uri="{0D108BD9-81ED-4DB2-BD59-A6C34878D82A}">
+                    <a16:rowId xmlns:a16="http://schemas.microsoft.com/office/drawing/2014/main" val="3303260823"/>
+                  </a:ext>
+                </a:extLst>
+              </a:tr>
+            </a:tbl>
+          </a:graphicData>
+        </a:graphic>
+      </p:graphicFrame>
+      <p:sp>
+        <p:nvSpPr>
+          <p:cNvPr id="8" name="Content Placeholder 2">
+            <a:extLst>
+              <a:ext uri="{FF2B5EF4-FFF2-40B4-BE49-F238E27FC236}">
+                <a16:creationId xmlns:a16="http://schemas.microsoft.com/office/drawing/2014/main" id="{1B201007-3EA4-4C0F-A1D9-A33BA87CC5A1}"/>
+              </a:ext>
+            </a:extLst>
+          </p:cNvPr>
+          <p:cNvSpPr txBox="1">
+            <a:spLocks/>
+          </p:cNvSpPr>
+          <p:nvPr/>
+        </p:nvSpPr>
+        <p:spPr>
+          <a:xfrm>
+            <a:off x="581192" y="1665243"/>
+            <a:ext cx="11029615" cy="1285103"/>
+          </a:xfrm>
+          <a:prstGeom prst="rect">
+            <a:avLst/>
+          </a:prstGeom>
+        </p:spPr>
+        <p:txBody>
+          <a:bodyPr vert="horz" lIns="91440" tIns="45720" rIns="91440" bIns="45720" rtlCol="0" anchor="ctr">
+            <a:normAutofit/>
+          </a:bodyPr>
+          <a:lstStyle>
+            <a:lvl1pPr marL="306000" indent="-306000" algn="l" defTabSz="457200" rtl="0" eaLnBrk="1" latinLnBrk="0" hangingPunct="1">
+              <a:spcBef>
+                <a:spcPct val="20000"/>
+              </a:spcBef>
+              <a:spcAft>
+                <a:spcPts val="600"/>
+              </a:spcAft>
+              <a:buClr>
+                <a:schemeClr val="accent2"/>
+              </a:buClr>
+              <a:buSzPct val="92000"/>
+              <a:buFont typeface="Wingdings 2" panose="05020102010507070707" pitchFamily="18" charset="2"/>
+              <a:buChar char=""/>
+              <a:defRPr sz="1800" kern="1200">
+                <a:solidFill>
+                  <a:schemeClr val="tx2"/>
+                </a:solidFill>
+                <a:latin typeface="+mn-lt"/>
+                <a:ea typeface="+mn-ea"/>
+                <a:cs typeface="+mn-cs"/>
+              </a:defRPr>
+            </a:lvl1pPr>
+            <a:lvl2pPr marL="630000" indent="-306000" algn="l" defTabSz="457200" rtl="0" eaLnBrk="1" latinLnBrk="0" hangingPunct="1">
+              <a:spcBef>
+                <a:spcPct val="20000"/>
+              </a:spcBef>
+              <a:spcAft>
+                <a:spcPts val="600"/>
+              </a:spcAft>
+              <a:buClr>
+                <a:schemeClr val="accent2"/>
+              </a:buClr>
+              <a:buSzPct val="92000"/>
+              <a:buFont typeface="Wingdings 2" panose="05020102010507070707" pitchFamily="18" charset="2"/>
+              <a:buChar char=""/>
+              <a:defRPr sz="1600" kern="1200">
+                <a:solidFill>
+                  <a:schemeClr val="tx2"/>
+                </a:solidFill>
+                <a:latin typeface="+mn-lt"/>
+                <a:ea typeface="+mn-ea"/>
+                <a:cs typeface="+mn-cs"/>
+              </a:defRPr>
+            </a:lvl2pPr>
+            <a:lvl3pPr marL="900000" indent="-270000" algn="l" defTabSz="457200" rtl="0" eaLnBrk="1" latinLnBrk="0" hangingPunct="1">
+              <a:spcBef>
+                <a:spcPct val="20000"/>
+              </a:spcBef>
+              <a:spcAft>
+                <a:spcPts val="600"/>
+              </a:spcAft>
+              <a:buClr>
+                <a:schemeClr val="accent2"/>
+              </a:buClr>
+              <a:buSzPct val="92000"/>
+              <a:buFont typeface="Wingdings 2" panose="05020102010507070707" pitchFamily="18" charset="2"/>
+              <a:buChar char=""/>
+              <a:defRPr sz="1400" kern="1200">
+                <a:solidFill>
+                  <a:schemeClr val="tx2"/>
+                </a:solidFill>
+                <a:latin typeface="+mn-lt"/>
+                <a:ea typeface="+mn-ea"/>
+                <a:cs typeface="+mn-cs"/>
+              </a:defRPr>
+            </a:lvl3pPr>
+            <a:lvl4pPr marL="1242000" indent="-234000" algn="l" defTabSz="457200" rtl="0" eaLnBrk="1" latinLnBrk="0" hangingPunct="1">
+              <a:spcBef>
+                <a:spcPct val="20000"/>
+              </a:spcBef>
+              <a:spcAft>
+                <a:spcPts val="600"/>
+              </a:spcAft>
+              <a:buClr>
+                <a:schemeClr val="accent2"/>
+              </a:buClr>
+              <a:buSzPct val="92000"/>
+              <a:buFont typeface="Wingdings 2" panose="05020102010507070707" pitchFamily="18" charset="2"/>
+              <a:buChar char=""/>
+              <a:defRPr sz="1200" kern="1200">
+                <a:solidFill>
+                  <a:schemeClr val="tx2"/>
+                </a:solidFill>
+                <a:latin typeface="+mn-lt"/>
+                <a:ea typeface="+mn-ea"/>
+                <a:cs typeface="+mn-cs"/>
+              </a:defRPr>
+            </a:lvl4pPr>
+            <a:lvl5pPr marL="1602000" indent="-234000" algn="l" defTabSz="457200" rtl="0" eaLnBrk="1" latinLnBrk="0" hangingPunct="1">
+              <a:spcBef>
+                <a:spcPct val="20000"/>
+              </a:spcBef>
+              <a:spcAft>
+                <a:spcPts val="600"/>
+              </a:spcAft>
+              <a:buClr>
+                <a:schemeClr val="accent2"/>
+              </a:buClr>
+              <a:buSzPct val="92000"/>
+              <a:buFont typeface="Wingdings 2" panose="05020102010507070707" pitchFamily="18" charset="2"/>
+              <a:buChar char=""/>
+              <a:defRPr sz="1200" kern="1200">
+                <a:solidFill>
+                  <a:schemeClr val="tx2"/>
+                </a:solidFill>
+                <a:latin typeface="+mn-lt"/>
+                <a:ea typeface="+mn-ea"/>
+                <a:cs typeface="+mn-cs"/>
+              </a:defRPr>
+            </a:lvl5pPr>
+            <a:lvl6pPr marL="1900000" indent="-228600" algn="l" defTabSz="457200" rtl="0" eaLnBrk="1" latinLnBrk="0" hangingPunct="1">
+              <a:spcBef>
+                <a:spcPct val="20000"/>
+              </a:spcBef>
+              <a:spcAft>
+                <a:spcPts val="600"/>
+              </a:spcAft>
+              <a:buClr>
+                <a:schemeClr val="accent2"/>
+              </a:buClr>
+              <a:buSzPct val="92000"/>
+              <a:buFont typeface="Wingdings 2" panose="05020102010507070707" pitchFamily="18" charset="2"/>
+              <a:buChar char=""/>
+              <a:defRPr sz="1200" kern="1200">
+                <a:solidFill>
+                  <a:schemeClr val="tx2"/>
+                </a:solidFill>
+                <a:latin typeface="+mn-lt"/>
+                <a:ea typeface="+mn-ea"/>
+                <a:cs typeface="+mn-cs"/>
+              </a:defRPr>
+            </a:lvl6pPr>
+            <a:lvl7pPr marL="2200000" indent="-228600" algn="l" defTabSz="457200" rtl="0" eaLnBrk="1" latinLnBrk="0" hangingPunct="1">
+              <a:spcBef>
+                <a:spcPct val="20000"/>
+              </a:spcBef>
+              <a:spcAft>
+                <a:spcPts val="600"/>
+              </a:spcAft>
+              <a:buClr>
+                <a:schemeClr val="accent2"/>
+              </a:buClr>
+              <a:buSzPct val="92000"/>
+              <a:buFont typeface="Wingdings 2" panose="05020102010507070707" pitchFamily="18" charset="2"/>
+              <a:buChar char=""/>
+              <a:defRPr sz="1200" kern="1200">
+                <a:solidFill>
+                  <a:schemeClr val="tx2"/>
+                </a:solidFill>
+                <a:latin typeface="+mn-lt"/>
+                <a:ea typeface="+mn-ea"/>
+                <a:cs typeface="+mn-cs"/>
+              </a:defRPr>
+            </a:lvl7pPr>
+            <a:lvl8pPr marL="2500000" indent="-228600" algn="l" defTabSz="457200" rtl="0" eaLnBrk="1" latinLnBrk="0" hangingPunct="1">
+              <a:spcBef>
+                <a:spcPct val="20000"/>
+              </a:spcBef>
+              <a:spcAft>
+                <a:spcPts val="600"/>
+              </a:spcAft>
+              <a:buClr>
+                <a:schemeClr val="accent2"/>
+              </a:buClr>
+              <a:buSzPct val="92000"/>
+              <a:buFont typeface="Wingdings 2" panose="05020102010507070707" pitchFamily="18" charset="2"/>
+              <a:buChar char=""/>
+              <a:defRPr sz="1200" kern="1200">
+                <a:solidFill>
+                  <a:schemeClr val="tx2"/>
+                </a:solidFill>
+                <a:latin typeface="+mn-lt"/>
+                <a:ea typeface="+mn-ea"/>
+                <a:cs typeface="+mn-cs"/>
+              </a:defRPr>
+            </a:lvl8pPr>
+            <a:lvl9pPr marL="2800000" indent="-228600" algn="l" defTabSz="457200" rtl="0" eaLnBrk="1" latinLnBrk="0" hangingPunct="1">
+              <a:spcBef>
+                <a:spcPct val="20000"/>
+              </a:spcBef>
+              <a:spcAft>
+                <a:spcPts val="600"/>
+              </a:spcAft>
+              <a:buClr>
+                <a:schemeClr val="accent2"/>
+              </a:buClr>
+              <a:buSzPct val="92000"/>
+              <a:buFont typeface="Wingdings 2" panose="05020102010507070707" pitchFamily="18" charset="2"/>
+              <a:buChar char=""/>
+              <a:defRPr sz="1200" kern="1200">
+                <a:solidFill>
+                  <a:schemeClr val="tx2"/>
+                </a:solidFill>
+                <a:latin typeface="+mn-lt"/>
+                <a:ea typeface="+mn-ea"/>
+                <a:cs typeface="+mn-cs"/>
+              </a:defRPr>
+            </a:lvl9pPr>
+          </a:lstStyle>
+          <a:p>
+            <a:pPr marL="0" indent="0">
+              <a:buNone/>
+            </a:pPr>
+            <a:r>
+              <a:rPr lang="en-US" dirty="0"/>
+              <a:t>1. EF Core DB provider</a:t>
+            </a:r>
+          </a:p>
+        </p:txBody>
+      </p:sp>
+    </p:spTree>
+    <p:extLst>
+      <p:ext uri="{BB962C8B-B14F-4D97-AF65-F5344CB8AC3E}">
+        <p14:creationId xmlns:p14="http://schemas.microsoft.com/office/powerpoint/2010/main" val="106638476"/>
+      </p:ext>
+    </p:extLst>
+  </p:cSld>
+  <p:clrMapOvr>
+    <a:masterClrMapping/>
+  </p:clrMapOvr>
+</p:sld>
+</file>
+
+<file path=ppt/slides/slide25.xml><?xml version="1.0" encoding="utf-8"?>
+<p:sld xmlns:a="http://schemas.openxmlformats.org/drawingml/2006/main" xmlns:r="http://schemas.openxmlformats.org/officeDocument/2006/relationships" xmlns:p="http://schemas.openxmlformats.org/presentationml/2006/main">
+  <p:cSld>
+    <p:spTree>
+      <p:nvGrpSpPr>
+        <p:cNvPr id="1" name=""/>
+        <p:cNvGrpSpPr/>
+        <p:nvPr/>
+      </p:nvGrpSpPr>
+      <p:grpSpPr>
+        <a:xfrm>
+          <a:off x="0" y="0"/>
+          <a:ext cx="0" cy="0"/>
+          <a:chOff x="0" y="0"/>
+          <a:chExt cx="0" cy="0"/>
+        </a:xfrm>
+      </p:grpSpPr>
+      <p:sp>
+        <p:nvSpPr>
+          <p:cNvPr id="2" name="Title 1">
+            <a:extLst>
+              <a:ext uri="{FF2B5EF4-FFF2-40B4-BE49-F238E27FC236}">
+                <a16:creationId xmlns:a16="http://schemas.microsoft.com/office/drawing/2014/main" id="{B0D62AAD-5238-4DC6-B246-1C9FA42F30E2}"/>
+              </a:ext>
+            </a:extLst>
+          </p:cNvPr>
+          <p:cNvSpPr>
+            <a:spLocks noGrp="1"/>
+          </p:cNvSpPr>
+          <p:nvPr>
+            <p:ph type="title"/>
+          </p:nvPr>
+        </p:nvSpPr>
+        <p:spPr/>
+        <p:txBody>
+          <a:bodyPr/>
+          <a:lstStyle/>
+          <a:p>
+            <a:r>
+              <a:rPr lang="en-US" dirty="0"/>
+              <a:t>EF Core</a:t>
+            </a:r>
+          </a:p>
+        </p:txBody>
+      </p:sp>
+      <p:sp>
+        <p:nvSpPr>
+          <p:cNvPr id="3" name="Content Placeholder 2">
+            <a:extLst>
+              <a:ext uri="{FF2B5EF4-FFF2-40B4-BE49-F238E27FC236}">
+                <a16:creationId xmlns:a16="http://schemas.microsoft.com/office/drawing/2014/main" id="{79A29536-9B2C-4240-86CE-72948111588E}"/>
+              </a:ext>
+            </a:extLst>
+          </p:cNvPr>
+          <p:cNvSpPr>
+            <a:spLocks noGrp="1"/>
+          </p:cNvSpPr>
+          <p:nvPr>
+            <p:ph idx="1"/>
+          </p:nvPr>
+        </p:nvSpPr>
+        <p:spPr/>
+        <p:txBody>
+          <a:bodyPr/>
+          <a:lstStyle/>
+          <a:p>
+            <a:r>
+              <a:rPr lang="en-US" dirty="0"/>
+              <a:t>Creating a Model for an Existing Database in Entity Framework Core</a:t>
+            </a:r>
+          </a:p>
+          <a:p>
+            <a:pPr marL="0" indent="0">
+              <a:buNone/>
+            </a:pPr>
+            <a:r>
+              <a:rPr lang="en-US" dirty="0"/>
+              <a:t>In Visual Studio, select menu Tools -&gt; NuGet Package Manger -&gt; Package Manger Console</a:t>
+            </a:r>
+          </a:p>
+          <a:p>
+            <a:pPr marL="0" indent="0">
+              <a:buNone/>
+            </a:pPr>
+            <a:r>
+              <a:rPr lang="en-US" dirty="0"/>
+              <a:t>	Scaffold-</a:t>
+            </a:r>
+            <a:r>
+              <a:rPr lang="en-US" dirty="0" err="1"/>
+              <a:t>DbContext</a:t>
+            </a:r>
+            <a:r>
+              <a:rPr lang="en-US" dirty="0"/>
+              <a:t> [-Connection] [-Provider] [-</a:t>
+            </a:r>
+            <a:r>
+              <a:rPr lang="en-US" dirty="0" err="1"/>
+              <a:t>OutputDir</a:t>
+            </a:r>
+            <a:r>
+              <a:rPr lang="en-US" dirty="0"/>
+              <a:t>] [-Context] [-Schemas&gt;] [-Tables&gt;] </a:t>
+            </a:r>
+          </a:p>
+          <a:p>
+            <a:pPr marL="0" indent="0">
+              <a:buNone/>
+            </a:pPr>
+            <a:r>
+              <a:rPr lang="en-US" dirty="0"/>
+              <a:t>                   [-</a:t>
+            </a:r>
+            <a:r>
+              <a:rPr lang="en-US" dirty="0" err="1"/>
+              <a:t>DataAnnotations</a:t>
+            </a:r>
+            <a:r>
+              <a:rPr lang="en-US" dirty="0"/>
+              <a:t>] [-Force] [-Project] [-</a:t>
+            </a:r>
+            <a:r>
+              <a:rPr lang="en-US" dirty="0" err="1"/>
+              <a:t>StartupProject</a:t>
+            </a:r>
+            <a:r>
+              <a:rPr lang="en-US" dirty="0"/>
+              <a:t>] [&lt;</a:t>
+            </a:r>
+            <a:r>
+              <a:rPr lang="en-US" dirty="0" err="1"/>
+              <a:t>CommonParameters</a:t>
+            </a:r>
+            <a:r>
+              <a:rPr lang="en-US" dirty="0"/>
+              <a:t>&gt;]</a:t>
+            </a:r>
+          </a:p>
+          <a:p>
+            <a:pPr marL="0" indent="0">
+              <a:buNone/>
+            </a:pPr>
+            <a:r>
+              <a:rPr lang="en-US" dirty="0"/>
+              <a:t>Example</a:t>
+            </a:r>
+          </a:p>
+          <a:p>
+            <a:pPr marL="0" indent="0">
+              <a:buNone/>
+            </a:pPr>
+            <a:r>
+              <a:rPr lang="en-US" dirty="0"/>
+              <a:t>	Scaffold-</a:t>
+            </a:r>
+            <a:r>
+              <a:rPr lang="en-US" dirty="0" err="1"/>
+              <a:t>DbContext</a:t>
+            </a:r>
+            <a:r>
+              <a:rPr lang="en-US" dirty="0"/>
+              <a:t> "Server=.\</a:t>
+            </a:r>
+            <a:r>
+              <a:rPr lang="en-US" dirty="0" err="1"/>
+              <a:t>SQLExpress;Database</a:t>
+            </a:r>
+            <a:r>
+              <a:rPr lang="en-US" dirty="0"/>
+              <a:t>=</a:t>
+            </a:r>
+            <a:r>
+              <a:rPr lang="en-US" dirty="0" err="1"/>
+              <a:t>SchoolDB;Trusted_Connection</a:t>
+            </a:r>
+            <a:r>
+              <a:rPr lang="en-US" dirty="0"/>
+              <a:t>=True;" </a:t>
+            </a:r>
+            <a:r>
+              <a:rPr lang="en-US" dirty="0" err="1"/>
+              <a:t>Microsoft.EntityFrameworkCore.SqlServer</a:t>
+            </a:r>
+            <a:r>
+              <a:rPr lang="en-US" dirty="0"/>
+              <a:t> -</a:t>
+            </a:r>
+            <a:r>
+              <a:rPr lang="en-US" dirty="0" err="1"/>
+              <a:t>OutputDir</a:t>
+            </a:r>
+            <a:r>
+              <a:rPr lang="en-US" dirty="0"/>
+              <a:t> Models</a:t>
+            </a:r>
+          </a:p>
+          <a:p>
+            <a:endParaRPr lang="en-US" dirty="0"/>
+          </a:p>
+        </p:txBody>
+      </p:sp>
+    </p:spTree>
+    <p:extLst>
+      <p:ext uri="{BB962C8B-B14F-4D97-AF65-F5344CB8AC3E}">
+        <p14:creationId xmlns:p14="http://schemas.microsoft.com/office/powerpoint/2010/main" val="2261907555"/>
+      </p:ext>
+    </p:extLst>
+  </p:cSld>
+  <p:clrMapOvr>
+    <a:masterClrMapping/>
+  </p:clrMapOvr>
+</p:sld>
+</file>
+
+<file path=ppt/slides/slide26.xml><?xml version="1.0" encoding="utf-8"?>
+<p:sld xmlns:a="http://schemas.openxmlformats.org/drawingml/2006/main" xmlns:r="http://schemas.openxmlformats.org/officeDocument/2006/relationships" xmlns:p="http://schemas.openxmlformats.org/presentationml/2006/main">
+  <p:cSld>
+    <p:spTree>
+      <p:nvGrpSpPr>
+        <p:cNvPr id="1" name=""/>
+        <p:cNvGrpSpPr/>
+        <p:nvPr/>
+      </p:nvGrpSpPr>
+      <p:grpSpPr>
+        <a:xfrm>
+          <a:off x="0" y="0"/>
+          <a:ext cx="0" cy="0"/>
+          <a:chOff x="0" y="0"/>
+          <a:chExt cx="0" cy="0"/>
+        </a:xfrm>
+      </p:grpSpPr>
+      <p:sp>
+        <p:nvSpPr>
+          <p:cNvPr id="2" name="Title 1">
+            <a:extLst>
+              <a:ext uri="{FF2B5EF4-FFF2-40B4-BE49-F238E27FC236}">
+                <a16:creationId xmlns:a16="http://schemas.microsoft.com/office/drawing/2014/main" id="{B0D62AAD-5238-4DC6-B246-1C9FA42F30E2}"/>
+              </a:ext>
+            </a:extLst>
+          </p:cNvPr>
+          <p:cNvSpPr>
+            <a:spLocks noGrp="1"/>
+          </p:cNvSpPr>
+          <p:nvPr>
+            <p:ph type="title"/>
+          </p:nvPr>
+        </p:nvSpPr>
+        <p:spPr/>
+        <p:txBody>
+          <a:bodyPr/>
+          <a:lstStyle/>
+          <a:p>
+            <a:r>
+              <a:rPr lang="en-US" dirty="0"/>
+              <a:t>EF Core</a:t>
+            </a:r>
+          </a:p>
+        </p:txBody>
+      </p:sp>
+      <p:pic>
+        <p:nvPicPr>
+          <p:cNvPr id="7" name="Content Placeholder 6">
+            <a:extLst>
+              <a:ext uri="{FF2B5EF4-FFF2-40B4-BE49-F238E27FC236}">
+                <a16:creationId xmlns:a16="http://schemas.microsoft.com/office/drawing/2014/main" id="{1BC87734-DBD9-4A8A-8913-17F1EFCE08DE}"/>
+              </a:ext>
+            </a:extLst>
+          </p:cNvPr>
+          <p:cNvPicPr>
+            <a:picLocks noGrp="1" noChangeAspect="1"/>
+          </p:cNvPicPr>
+          <p:nvPr>
+            <p:ph idx="1"/>
+          </p:nvPr>
+        </p:nvPicPr>
+        <p:blipFill>
+          <a:blip r:embed="rId2"/>
+          <a:stretch>
+            <a:fillRect/>
+          </a:stretch>
+        </p:blipFill>
+        <p:spPr>
+          <a:xfrm>
+            <a:off x="581192" y="1825491"/>
+            <a:ext cx="3508677" cy="4733929"/>
+          </a:xfrm>
+        </p:spPr>
+      </p:pic>
+    </p:spTree>
+    <p:extLst>
+      <p:ext uri="{BB962C8B-B14F-4D97-AF65-F5344CB8AC3E}">
+        <p14:creationId xmlns:p14="http://schemas.microsoft.com/office/powerpoint/2010/main" val="3974301748"/>
+      </p:ext>
+    </p:extLst>
+  </p:cSld>
+  <p:clrMapOvr>
+    <a:masterClrMapping/>
+  </p:clrMapOvr>
+</p:sld>
+</file>
+
+<file path=ppt/slides/slide27.xml><?xml version="1.0" encoding="utf-8"?>
+<p:sld xmlns:a="http://schemas.openxmlformats.org/drawingml/2006/main" xmlns:r="http://schemas.openxmlformats.org/officeDocument/2006/relationships" xmlns:p="http://schemas.openxmlformats.org/presentationml/2006/main">
+  <p:cSld>
+    <p:spTree>
+      <p:nvGrpSpPr>
+        <p:cNvPr id="1" name=""/>
+        <p:cNvGrpSpPr/>
+        <p:nvPr/>
+      </p:nvGrpSpPr>
+      <p:grpSpPr>
+        <a:xfrm>
+          <a:off x="0" y="0"/>
+          <a:ext cx="0" cy="0"/>
+          <a:chOff x="0" y="0"/>
+          <a:chExt cx="0" cy="0"/>
+        </a:xfrm>
+      </p:grpSpPr>
+      <p:sp>
+        <p:nvSpPr>
+          <p:cNvPr id="2" name="Title 1">
+            <a:extLst>
+              <a:ext uri="{FF2B5EF4-FFF2-40B4-BE49-F238E27FC236}">
+                <a16:creationId xmlns:a16="http://schemas.microsoft.com/office/drawing/2014/main" id="{8F9C4A50-907C-4279-9B18-FD98DC6A6BE7}"/>
+              </a:ext>
+            </a:extLst>
+          </p:cNvPr>
+          <p:cNvSpPr>
+            <a:spLocks noGrp="1"/>
+          </p:cNvSpPr>
+          <p:nvPr>
+            <p:ph type="title"/>
+          </p:nvPr>
+        </p:nvSpPr>
+        <p:spPr/>
+        <p:txBody>
+          <a:bodyPr/>
+          <a:lstStyle/>
+          <a:p>
+            <a:r>
+              <a:rPr lang="en-US" dirty="0"/>
+              <a:t>Assignment</a:t>
+            </a:r>
+          </a:p>
+        </p:txBody>
+      </p:sp>
+      <p:sp>
+        <p:nvSpPr>
+          <p:cNvPr id="3" name="Content Placeholder 2">
+            <a:extLst>
+              <a:ext uri="{FF2B5EF4-FFF2-40B4-BE49-F238E27FC236}">
+                <a16:creationId xmlns:a16="http://schemas.microsoft.com/office/drawing/2014/main" id="{7C1F6D55-A9F2-4D93-9E12-89229A563C70}"/>
+              </a:ext>
+            </a:extLst>
+          </p:cNvPr>
+          <p:cNvSpPr>
+            <a:spLocks noGrp="1"/>
+          </p:cNvSpPr>
+          <p:nvPr>
+            <p:ph idx="1"/>
+          </p:nvPr>
+        </p:nvSpPr>
+        <p:spPr/>
+        <p:txBody>
+          <a:bodyPr/>
+          <a:lstStyle/>
+          <a:p>
+            <a:r>
+              <a:rPr lang="en-US" dirty="0"/>
+              <a:t>Create Console Application With </a:t>
+            </a:r>
+            <a:r>
+              <a:rPr lang="en-US" dirty="0" err="1"/>
+              <a:t>EntityFramework</a:t>
+            </a:r>
+            <a:r>
+              <a:rPr lang="en-US" dirty="0"/>
+              <a:t> </a:t>
+            </a:r>
+          </a:p>
+          <a:p>
+            <a:r>
+              <a:rPr lang="en-US" dirty="0"/>
+              <a:t>Create CRUD Service ( Add, Select, Update, Delete )</a:t>
+            </a:r>
+          </a:p>
+          <a:p>
+            <a:r>
+              <a:rPr lang="en-US" dirty="0"/>
+              <a:t>Create Unit test</a:t>
+            </a:r>
+          </a:p>
+        </p:txBody>
+      </p:sp>
+    </p:spTree>
+    <p:extLst>
+      <p:ext uri="{BB962C8B-B14F-4D97-AF65-F5344CB8AC3E}">
+        <p14:creationId xmlns:p14="http://schemas.microsoft.com/office/powerpoint/2010/main" val="3047149711"/>
       </p:ext>
     </p:extLst>
   </p:cSld>

</xml_diff>

<commit_message>
add how to use transaction unit test
</commit_message>
<xml_diff>
--- a/entity framework/Entity Framework.pptx
+++ b/entity framework/Entity Framework.pptx
@@ -31,7 +31,8 @@
     <p:sldId id="276" r:id="rId25"/>
     <p:sldId id="277" r:id="rId26"/>
     <p:sldId id="278" r:id="rId27"/>
-    <p:sldId id="282" r:id="rId28"/>
+    <p:sldId id="283" r:id="rId28"/>
+    <p:sldId id="282" r:id="rId29"/>
   </p:sldIdLst>
   <p:sldSz cx="12192000" cy="6858000"/>
   <p:notesSz cx="6858000" cy="9144000"/>
@@ -159,7 +160,7 @@
             <p14:sldId id="273"/>
           </p14:sldIdLst>
         </p14:section>
-        <p14:section name="Ef6" id="{7FD257D5-0B32-4831-880A-3F9ECC28200A}">
+        <p14:section name="Ef6 DB First" id="{7FD257D5-0B32-4831-880A-3F9ECC28200A}">
           <p14:sldIdLst>
             <p14:sldId id="272"/>
             <p14:sldId id="279"/>
@@ -167,12 +168,17 @@
             <p14:sldId id="281"/>
           </p14:sldIdLst>
         </p14:section>
-        <p14:section name="EF Core" id="{CA285C2E-6AB4-49A8-B076-2A59E42269B9}">
+        <p14:section name="EF Core DB First" id="{CA285C2E-6AB4-49A8-B076-2A59E42269B9}">
           <p14:sldIdLst>
             <p14:sldId id="275"/>
             <p14:sldId id="276"/>
             <p14:sldId id="277"/>
             <p14:sldId id="278"/>
+          </p14:sldIdLst>
+        </p14:section>
+        <p14:section name="Unit test" id="{4533B488-3847-470A-8951-1DC33B787AC4}">
+          <p14:sldIdLst>
+            <p14:sldId id="283"/>
           </p14:sldIdLst>
         </p14:section>
         <p14:section name="Assignment" id="{454073A0-5C1E-42F2-9EC3-A49A769C641A}">
@@ -435,7 +441,7 @@
             <a:fld id="{B61BEF0D-F0BB-DE4B-95CE-6DB70DBA9567}" type="datetimeFigureOut">
               <a:rPr lang="en-US" dirty="0"/>
               <a:pPr/>
-              <a:t>10/8/2018</a:t>
+              <a:t>10/9/2018</a:t>
             </a:fld>
             <a:endParaRPr lang="en-US" dirty="0"/>
           </a:p>
@@ -694,7 +700,7 @@
             <a:fld id="{B61BEF0D-F0BB-DE4B-95CE-6DB70DBA9567}" type="datetimeFigureOut">
               <a:rPr lang="en-US" dirty="0"/>
               <a:pPr/>
-              <a:t>10/8/2018</a:t>
+              <a:t>10/9/2018</a:t>
             </a:fld>
             <a:endParaRPr lang="en-US" dirty="0"/>
           </a:p>
@@ -926,7 +932,7 @@
             <a:fld id="{B61BEF0D-F0BB-DE4B-95CE-6DB70DBA9567}" type="datetimeFigureOut">
               <a:rPr lang="en-US" dirty="0"/>
               <a:pPr/>
-              <a:t>10/8/2018</a:t>
+              <a:t>10/9/2018</a:t>
             </a:fld>
             <a:endParaRPr lang="en-US" dirty="0"/>
           </a:p>
@@ -1163,7 +1169,7 @@
             <a:fld id="{B61BEF0D-F0BB-DE4B-95CE-6DB70DBA9567}" type="datetimeFigureOut">
               <a:rPr lang="en-US" dirty="0"/>
               <a:pPr/>
-              <a:t>10/8/2018</a:t>
+              <a:t>10/9/2018</a:t>
             </a:fld>
             <a:endParaRPr lang="en-US" dirty="0"/>
           </a:p>
@@ -1467,7 +1473,7 @@
             <a:fld id="{B61BEF0D-F0BB-DE4B-95CE-6DB70DBA9567}" type="datetimeFigureOut">
               <a:rPr lang="en-US" dirty="0"/>
               <a:pPr/>
-              <a:t>10/8/2018</a:t>
+              <a:t>10/9/2018</a:t>
             </a:fld>
             <a:endParaRPr lang="en-US" dirty="0"/>
           </a:p>
@@ -1766,7 +1772,7 @@
             <a:fld id="{B61BEF0D-F0BB-DE4B-95CE-6DB70DBA9567}" type="datetimeFigureOut">
               <a:rPr lang="en-US" dirty="0"/>
               <a:pPr/>
-              <a:t>10/8/2018</a:t>
+              <a:t>10/9/2018</a:t>
             </a:fld>
             <a:endParaRPr lang="en-US" dirty="0"/>
           </a:p>
@@ -2185,7 +2191,7 @@
             <a:fld id="{B61BEF0D-F0BB-DE4B-95CE-6DB70DBA9567}" type="datetimeFigureOut">
               <a:rPr lang="en-US" dirty="0"/>
               <a:pPr/>
-              <a:t>10/8/2018</a:t>
+              <a:t>10/9/2018</a:t>
             </a:fld>
             <a:endParaRPr lang="en-US" dirty="0"/>
           </a:p>
@@ -2344,7 +2350,7 @@
             <a:fld id="{B61BEF0D-F0BB-DE4B-95CE-6DB70DBA9567}" type="datetimeFigureOut">
               <a:rPr lang="en-US" dirty="0"/>
               <a:pPr/>
-              <a:t>10/8/2018</a:t>
+              <a:t>10/9/2018</a:t>
             </a:fld>
             <a:endParaRPr lang="en-US" dirty="0"/>
           </a:p>
@@ -2436,7 +2442,7 @@
             <a:fld id="{B61BEF0D-F0BB-DE4B-95CE-6DB70DBA9567}" type="datetimeFigureOut">
               <a:rPr lang="en-US" dirty="0"/>
               <a:pPr/>
-              <a:t>10/8/2018</a:t>
+              <a:t>10/9/2018</a:t>
             </a:fld>
             <a:endParaRPr lang="en-US" dirty="0"/>
           </a:p>
@@ -2811,7 +2817,7 @@
             <a:fld id="{B61BEF0D-F0BB-DE4B-95CE-6DB70DBA9567}" type="datetimeFigureOut">
               <a:rPr lang="en-US" dirty="0"/>
               <a:pPr/>
-              <a:t>10/8/2018</a:t>
+              <a:t>10/9/2018</a:t>
             </a:fld>
             <a:endParaRPr lang="en-US" dirty="0"/>
           </a:p>
@@ -3097,7 +3103,7 @@
             <a:fld id="{B61BEF0D-F0BB-DE4B-95CE-6DB70DBA9567}" type="datetimeFigureOut">
               <a:rPr lang="en-US" dirty="0"/>
               <a:pPr/>
-              <a:t>10/8/2018</a:t>
+              <a:t>10/9/2018</a:t>
             </a:fld>
             <a:endParaRPr lang="en-US" dirty="0"/>
           </a:p>
@@ -3305,7 +3311,7 @@
             <a:fld id="{B61BEF0D-F0BB-DE4B-95CE-6DB70DBA9567}" type="datetimeFigureOut">
               <a:rPr lang="en-US" dirty="0"/>
               <a:pPr/>
-              <a:t>10/8/2018</a:t>
+              <a:t>10/9/2018</a:t>
             </a:fld>
             <a:endParaRPr lang="en-US" dirty="0"/>
           </a:p>
@@ -7307,6 +7313,180 @@
           <p:cNvPr id="2" name="Title 1">
             <a:extLst>
               <a:ext uri="{FF2B5EF4-FFF2-40B4-BE49-F238E27FC236}">
+                <a16:creationId xmlns:a16="http://schemas.microsoft.com/office/drawing/2014/main" id="{945FC7E1-F563-4153-BE56-0984E8D0F527}"/>
+              </a:ext>
+            </a:extLst>
+          </p:cNvPr>
+          <p:cNvSpPr>
+            <a:spLocks noGrp="1"/>
+          </p:cNvSpPr>
+          <p:nvPr>
+            <p:ph type="title"/>
+          </p:nvPr>
+        </p:nvSpPr>
+        <p:spPr/>
+        <p:txBody>
+          <a:bodyPr/>
+          <a:lstStyle/>
+          <a:p>
+            <a:r>
+              <a:rPr lang="en-US" dirty="0"/>
+              <a:t>Unit Test</a:t>
+            </a:r>
+          </a:p>
+        </p:txBody>
+      </p:sp>
+      <p:sp>
+        <p:nvSpPr>
+          <p:cNvPr id="3" name="Content Placeholder 2">
+            <a:extLst>
+              <a:ext uri="{FF2B5EF4-FFF2-40B4-BE49-F238E27FC236}">
+                <a16:creationId xmlns:a16="http://schemas.microsoft.com/office/drawing/2014/main" id="{43A33BE7-FB7F-4709-9C22-0997D517A08B}"/>
+              </a:ext>
+            </a:extLst>
+          </p:cNvPr>
+          <p:cNvSpPr>
+            <a:spLocks noGrp="1"/>
+          </p:cNvSpPr>
+          <p:nvPr>
+            <p:ph idx="1"/>
+          </p:nvPr>
+        </p:nvSpPr>
+        <p:spPr>
+          <a:xfrm>
+            <a:off x="347927" y="1934642"/>
+            <a:ext cx="5521027" cy="3343225"/>
+          </a:xfrm>
+        </p:spPr>
+        <p:txBody>
+          <a:bodyPr/>
+          <a:lstStyle/>
+          <a:p>
+            <a:pPr marL="0" indent="0">
+              <a:buNone/>
+            </a:pPr>
+            <a:r>
+              <a:rPr lang="en-US" dirty="0"/>
+              <a:t>1- Install the </a:t>
+            </a:r>
+            <a:r>
+              <a:rPr lang="en-US" dirty="0" err="1"/>
+              <a:t>EntityFramework</a:t>
+            </a:r>
+            <a:r>
+              <a:rPr lang="en-US" dirty="0"/>
+              <a:t> into the Test Project. </a:t>
+            </a:r>
+          </a:p>
+          <a:p>
+            <a:pPr marL="0" indent="0">
+              <a:buNone/>
+            </a:pPr>
+            <a:r>
+              <a:rPr lang="en-US" dirty="0"/>
+              <a:t>2- Put the connection string into the </a:t>
+            </a:r>
+            <a:r>
+              <a:rPr lang="en-US" dirty="0" err="1"/>
+              <a:t>app.config</a:t>
+            </a:r>
+            <a:r>
+              <a:rPr lang="en-US" dirty="0"/>
+              <a:t> file of Test Project. </a:t>
+            </a:r>
+          </a:p>
+          <a:p>
+            <a:pPr marL="0" indent="0">
+              <a:buNone/>
+            </a:pPr>
+            <a:r>
+              <a:rPr lang="en-US" dirty="0"/>
+              <a:t>3- Reference the </a:t>
+            </a:r>
+            <a:r>
+              <a:rPr lang="en-US" dirty="0" err="1"/>
+              <a:t>dll</a:t>
+            </a:r>
+            <a:r>
+              <a:rPr lang="en-US" dirty="0"/>
+              <a:t> </a:t>
+            </a:r>
+            <a:r>
+              <a:rPr lang="en-US" dirty="0" err="1"/>
+              <a:t>System.Transactions</a:t>
+            </a:r>
+            <a:r>
+              <a:rPr lang="en-US" dirty="0"/>
+              <a:t> in Test Project.</a:t>
+            </a:r>
+          </a:p>
+        </p:txBody>
+      </p:sp>
+      <p:pic>
+        <p:nvPicPr>
+          <p:cNvPr id="4" name="Picture 3">
+            <a:extLst>
+              <a:ext uri="{FF2B5EF4-FFF2-40B4-BE49-F238E27FC236}">
+                <a16:creationId xmlns:a16="http://schemas.microsoft.com/office/drawing/2014/main" id="{B2453865-8061-4F4D-937C-F55354609CEA}"/>
+              </a:ext>
+            </a:extLst>
+          </p:cNvPr>
+          <p:cNvPicPr>
+            <a:picLocks noChangeAspect="1"/>
+          </p:cNvPicPr>
+          <p:nvPr/>
+        </p:nvPicPr>
+        <p:blipFill>
+          <a:blip r:embed="rId2"/>
+          <a:stretch>
+            <a:fillRect/>
+          </a:stretch>
+        </p:blipFill>
+        <p:spPr>
+          <a:xfrm>
+            <a:off x="6095999" y="1934642"/>
+            <a:ext cx="5614247" cy="4680761"/>
+          </a:xfrm>
+          <a:prstGeom prst="rect">
+            <a:avLst/>
+          </a:prstGeom>
+        </p:spPr>
+      </p:pic>
+    </p:spTree>
+    <p:extLst>
+      <p:ext uri="{BB962C8B-B14F-4D97-AF65-F5344CB8AC3E}">
+        <p14:creationId xmlns:p14="http://schemas.microsoft.com/office/powerpoint/2010/main" val="700893272"/>
+      </p:ext>
+    </p:extLst>
+  </p:cSld>
+  <p:clrMapOvr>
+    <a:masterClrMapping/>
+  </p:clrMapOvr>
+</p:sld>
+</file>
+
+<file path=ppt/slides/slide28.xml><?xml version="1.0" encoding="utf-8"?>
+<p:sld xmlns:a="http://schemas.openxmlformats.org/drawingml/2006/main" xmlns:r="http://schemas.openxmlformats.org/officeDocument/2006/relationships" xmlns:p="http://schemas.openxmlformats.org/presentationml/2006/main">
+  <p:cSld>
+    <p:spTree>
+      <p:nvGrpSpPr>
+        <p:cNvPr id="1" name=""/>
+        <p:cNvGrpSpPr/>
+        <p:nvPr/>
+      </p:nvGrpSpPr>
+      <p:grpSpPr>
+        <a:xfrm>
+          <a:off x="0" y="0"/>
+          <a:ext cx="0" cy="0"/>
+          <a:chOff x="0" y="0"/>
+          <a:chExt cx="0" cy="0"/>
+        </a:xfrm>
+      </p:grpSpPr>
+      <p:sp>
+        <p:nvSpPr>
+          <p:cNvPr id="2" name="Title 1">
+            <a:extLst>
+              <a:ext uri="{FF2B5EF4-FFF2-40B4-BE49-F238E27FC236}">
                 <a16:creationId xmlns:a16="http://schemas.microsoft.com/office/drawing/2014/main" id="{8F9C4A50-907C-4279-9B18-FD98DC6A6BE7}"/>
               </a:ext>
             </a:extLst>

</xml_diff>